<commit_message>
Changed delete() methods to remove() methods
</commit_message>
<xml_diff>
--- a/lesson-react-40-redux/react-redux.pptx
+++ b/lesson-react-40-redux/react-redux.pptx
@@ -1974,7 +1974,7 @@
           <a:noFill/>
           <a:extLst>
             <a:ext uri="{909E8E84-426E-40dd-AFC4-6F175D3DCCD1}">
-              <a14:hiddenFill xmlns:a14="http://schemas.microsoft.com/office/drawing/2010/main" xmlns="">
+              <a14:hiddenFill xmlns="" xmlns:a14="http://schemas.microsoft.com/office/drawing/2010/main">
                 <a:solidFill>
                   <a:srgbClr val="FFFFFF"/>
                 </a:solidFill>
@@ -13605,7 +13605,15 @@
                   <a:srgbClr val="FF0000"/>
                 </a:solidFill>
               </a:rPr>
-              <a:t>dispatch, name, quote</a:t>
+              <a:t>name</a:t>
+            </a:r>
+            <a:r>
+              <a:rPr lang="en-US" dirty="0" smtClean="0">
+                <a:solidFill>
+                  <a:srgbClr val="FF0000"/>
+                </a:solidFill>
+              </a:rPr>
+              <a:t>, quote</a:t>
             </a:r>
             <a:r>
               <a:rPr lang="en-US" dirty="0" smtClean="0"/>
@@ -15494,7 +15502,19 @@
           <a:p>
             <a:r>
               <a:rPr lang="en-US" dirty="0" smtClean="0"/>
-              <a:t>Configure the Store</a:t>
+              <a:t>Configure the </a:t>
+            </a:r>
+            <a:r>
+              <a:rPr lang="en-US" dirty="0" smtClean="0"/>
+              <a:t>Store </a:t>
+            </a:r>
+            <a:r>
+              <a:rPr lang="mr-IN" dirty="0" smtClean="0"/>
+              <a:t>–</a:t>
+            </a:r>
+            <a:r>
+              <a:rPr lang="en-US" dirty="0" smtClean="0"/>
+              <a:t> One Reducer</a:t>
             </a:r>
             <a:endParaRPr lang="en-US" dirty="0"/>
           </a:p>
@@ -16106,7 +16126,19 @@
           <a:p>
             <a:r>
               <a:rPr lang="en-US" dirty="0" smtClean="0"/>
-              <a:t>Configure the Store</a:t>
+              <a:t>Configure the </a:t>
+            </a:r>
+            <a:r>
+              <a:rPr lang="en-US" dirty="0" smtClean="0"/>
+              <a:t>Store </a:t>
+            </a:r>
+            <a:r>
+              <a:rPr lang="mr-IN" dirty="0" smtClean="0"/>
+              <a:t>–</a:t>
+            </a:r>
+            <a:r>
+              <a:rPr lang="en-US" dirty="0" smtClean="0"/>
+              <a:t> Multiple Reducers</a:t>
             </a:r>
             <a:endParaRPr lang="en-US" dirty="0"/>
           </a:p>
@@ -20477,19 +20509,7 @@
             </a:pPr>
             <a:r>
               <a:rPr lang="en-US" dirty="0" smtClean="0"/>
-              <a:t>No change </a:t>
-            </a:r>
-            <a:r>
-              <a:rPr lang="en-US" dirty="0" smtClean="0"/>
-              <a:t>to</a:t>
-            </a:r>
-            <a:r>
-              <a:rPr lang="en-US" dirty="0" smtClean="0"/>
-              <a:t> </a:t>
-            </a:r>
-            <a:r>
-              <a:rPr lang="en-US" dirty="0" smtClean="0"/>
-              <a:t>input parameters</a:t>
+              <a:t>No change to input parameters</a:t>
             </a:r>
           </a:p>
           <a:p>
@@ -21441,7 +21461,6 @@
               <a:rPr lang="en-US" dirty="0" smtClean="0"/>
               <a:t>to do</a:t>
             </a:r>
-            <a:endParaRPr lang="en-US" dirty="0" smtClean="0"/>
           </a:p>
           <a:p>
             <a:pPr marL="342900" indent="-342900">

</xml_diff>

<commit_message>
Changed from comments in last teach
</commit_message>
<xml_diff>
--- a/lesson-react-40-redux/react-redux.pptx
+++ b/lesson-react-40-redux/react-redux.pptx
@@ -5,10 +5,10 @@
     <p:sldMasterId id="2147483674" r:id="rId1"/>
   </p:sldMasterIdLst>
   <p:notesMasterIdLst>
-    <p:notesMasterId r:id="rId33"/>
+    <p:notesMasterId r:id="rId34"/>
   </p:notesMasterIdLst>
   <p:handoutMasterIdLst>
-    <p:handoutMasterId r:id="rId34"/>
+    <p:handoutMasterId r:id="rId35"/>
   </p:handoutMasterIdLst>
   <p:sldIdLst>
     <p:sldId id="298" r:id="rId2"/>
@@ -28,25 +28,26 @@
     <p:sldId id="426" r:id="rId16"/>
     <p:sldId id="389" r:id="rId17"/>
     <p:sldId id="390" r:id="rId18"/>
-    <p:sldId id="394" r:id="rId19"/>
-    <p:sldId id="413" r:id="rId20"/>
-    <p:sldId id="381" r:id="rId21"/>
-    <p:sldId id="397" r:id="rId22"/>
-    <p:sldId id="415" r:id="rId23"/>
-    <p:sldId id="416" r:id="rId24"/>
-    <p:sldId id="417" r:id="rId25"/>
-    <p:sldId id="421" r:id="rId26"/>
-    <p:sldId id="418" r:id="rId27"/>
-    <p:sldId id="419" r:id="rId28"/>
-    <p:sldId id="420" r:id="rId29"/>
-    <p:sldId id="414" r:id="rId30"/>
-    <p:sldId id="395" r:id="rId31"/>
-    <p:sldId id="379" r:id="rId32"/>
+    <p:sldId id="427" r:id="rId19"/>
+    <p:sldId id="394" r:id="rId20"/>
+    <p:sldId id="413" r:id="rId21"/>
+    <p:sldId id="381" r:id="rId22"/>
+    <p:sldId id="397" r:id="rId23"/>
+    <p:sldId id="415" r:id="rId24"/>
+    <p:sldId id="416" r:id="rId25"/>
+    <p:sldId id="417" r:id="rId26"/>
+    <p:sldId id="421" r:id="rId27"/>
+    <p:sldId id="418" r:id="rId28"/>
+    <p:sldId id="419" r:id="rId29"/>
+    <p:sldId id="420" r:id="rId30"/>
+    <p:sldId id="414" r:id="rId31"/>
+    <p:sldId id="395" r:id="rId32"/>
+    <p:sldId id="379" r:id="rId33"/>
   </p:sldIdLst>
   <p:sldSz cx="9144000" cy="6858000" type="screen4x3"/>
   <p:notesSz cx="6858000" cy="9144000"/>
   <p:custDataLst>
-    <p:tags r:id="rId35"/>
+    <p:tags r:id="rId36"/>
   </p:custDataLst>
   <p:defaultTextStyle>
     <a:defPPr>
@@ -1974,7 +1975,7 @@
           <a:noFill/>
           <a:extLst>
             <a:ext uri="{909E8E84-426E-40dd-AFC4-6F175D3DCCD1}">
-              <a14:hiddenFill xmlns:a14="http://schemas.microsoft.com/office/drawing/2010/main" xmlns="">
+              <a14:hiddenFill xmlns="" xmlns:a14="http://schemas.microsoft.com/office/drawing/2010/main">
                 <a:solidFill>
                   <a:srgbClr val="FFFFFF"/>
                 </a:solidFill>
@@ -14432,21 +14433,8 @@
                     <a:srgbClr val="FF0000"/>
                   </a:solidFill>
                 </a:rPr>
-                <a:t>() </a:t>
+                <a:t>() callback</a:t>
               </a:r>
-              <a:r>
-                <a:rPr lang="en-US" dirty="0" smtClean="0">
-                  <a:solidFill>
-                    <a:srgbClr val="FF0000"/>
-                  </a:solidFill>
-                </a:rPr>
-                <a:t>callback</a:t>
-              </a:r>
-              <a:endParaRPr lang="en-US" dirty="0" smtClean="0">
-                <a:solidFill>
-                  <a:srgbClr val="FF0000"/>
-                </a:solidFill>
-              </a:endParaRPr>
             </a:p>
           </p:txBody>
         </p:sp>
@@ -14602,402 +14590,180 @@
             </a:pPr>
             <a:r>
               <a:rPr lang="en-US" dirty="0" smtClean="0"/>
-              <a:t>File </a:t>
+              <a:t>Redux </a:t>
             </a:r>
             <a:r>
               <a:rPr lang="en-US" dirty="0" smtClean="0">
-                <a:sym typeface="Wingdings"/>
-              </a:rPr>
-              <a:t> </a:t>
-            </a:r>
-            <a:r>
-              <a:rPr lang="en-US" dirty="0" err="1" smtClean="0">
                 <a:solidFill>
                   <a:srgbClr val="FF0000"/>
                 </a:solidFill>
-                <a:sym typeface="Wingdings"/>
-              </a:rPr>
-              <a:t>index.js</a:t>
+              </a:rPr>
+              <a:t>CREATED</a:t>
+            </a:r>
+            <a:r>
+              <a:rPr lang="en-US" dirty="0" smtClean="0"/>
+              <a:t> </a:t>
+            </a:r>
+            <a:r>
+              <a:rPr lang="en-US" dirty="0" err="1" smtClean="0"/>
+              <a:t>QuoteContainer</a:t>
+            </a:r>
+            <a:r>
+              <a:rPr lang="en-US" dirty="0" smtClean="0"/>
+              <a:t> Component</a:t>
+            </a:r>
+            <a:endParaRPr lang="en-US" dirty="0" smtClean="0"/>
+          </a:p>
+          <a:p>
+            <a:pPr marL="342900" indent="-342900">
+              <a:buFont typeface="Arial" charset="0"/>
+              <a:buChar char="•"/>
+            </a:pPr>
+            <a:r>
+              <a:rPr lang="en-US" dirty="0" smtClean="0"/>
+              <a:t>Redux creates </a:t>
+            </a:r>
+            <a:r>
+              <a:rPr lang="en-US" dirty="0" smtClean="0"/>
+              <a:t>the</a:t>
+            </a:r>
+            <a:r>
+              <a:rPr lang="en-US" dirty="0" smtClean="0"/>
+              <a:t> </a:t>
+            </a:r>
+            <a:r>
+              <a:rPr lang="en-US" dirty="0" smtClean="0"/>
+              <a:t>Container around </a:t>
             </a:r>
             <a:r>
               <a:rPr lang="en-US" dirty="0" smtClean="0">
-                <a:sym typeface="Wingdings"/>
-              </a:rPr>
-              <a:t> </a:t>
-            </a:r>
-          </a:p>
-          <a:p>
-            <a:pPr marL="631825" lvl="1" indent="-342900">
-              <a:buFont typeface="Arial" charset="0"/>
-              <a:buChar char="•"/>
-            </a:pPr>
+                <a:solidFill>
+                  <a:srgbClr val="FF0000"/>
+                </a:solidFill>
+              </a:rPr>
+              <a:t>&lt;Quote&gt;</a:t>
+            </a:r>
+          </a:p>
+          <a:p>
+            <a:pPr marL="917575" lvl="2" indent="-342900">
+              <a:buFont typeface="Arial" charset="0"/>
+              <a:buChar char="•"/>
+            </a:pPr>
+            <a:r>
+              <a:rPr lang="en-US" dirty="0" smtClean="0"/>
+              <a:t>&lt;</a:t>
+            </a:r>
+            <a:r>
+              <a:rPr lang="en-US" b="1" dirty="0" smtClean="0">
+                <a:solidFill>
+                  <a:srgbClr val="000080"/>
+                </a:solidFill>
+              </a:rPr>
+              <a:t>Quote </a:t>
+            </a:r>
             <a:r>
               <a:rPr lang="en-US" b="1" dirty="0">
                 <a:solidFill>
                   <a:srgbClr val="000080"/>
                 </a:solidFill>
               </a:rPr>
-              <a:t>import </a:t>
+              <a:t/>
+            </a:r>
+            <a:br>
+              <a:rPr lang="en-US" b="1" dirty="0">
+                <a:solidFill>
+                  <a:srgbClr val="000080"/>
+                </a:solidFill>
+              </a:rPr>
+            </a:br>
+            <a:r>
+              <a:rPr lang="en-US" b="1" dirty="0">
+                <a:solidFill>
+                  <a:srgbClr val="000080"/>
+                </a:solidFill>
+              </a:rPr>
+              <a:t>   </a:t>
+            </a:r>
+            <a:r>
+              <a:rPr lang="en-US" b="1" dirty="0">
+                <a:solidFill>
+                  <a:srgbClr val="0000FF"/>
+                </a:solidFill>
+              </a:rPr>
+              <a:t>name</a:t>
+            </a:r>
+            <a:r>
+              <a:rPr lang="en-US" b="1" dirty="0">
+                <a:solidFill>
+                  <a:srgbClr val="008000"/>
+                </a:solidFill>
+              </a:rPr>
+              <a:t>=</a:t>
             </a:r>
             <a:r>
               <a:rPr lang="en-US" dirty="0"/>
-              <a:t>{ </a:t>
-            </a:r>
-            <a:r>
-              <a:rPr lang="en-US" b="1" dirty="0">
-                <a:solidFill>
-                  <a:srgbClr val="660E7A"/>
-                </a:solidFill>
-              </a:rPr>
-              <a:t>Provider </a:t>
+              <a:t>{</a:t>
+            </a:r>
+            <a:r>
+              <a:rPr lang="en-US" dirty="0" err="1"/>
+              <a:t>nameValue</a:t>
             </a:r>
             <a:r>
               <a:rPr lang="en-US" dirty="0"/>
               <a:t>} </a:t>
-            </a:r>
-            <a:r>
-              <a:rPr lang="en-US" b="1" dirty="0">
-                <a:solidFill>
-                  <a:srgbClr val="000080"/>
-                </a:solidFill>
-              </a:rPr>
-              <a:t>from </a:t>
-            </a:r>
-            <a:r>
-              <a:rPr lang="en-US" b="1" dirty="0">
-                <a:solidFill>
-                  <a:srgbClr val="008000"/>
-                </a:solidFill>
-              </a:rPr>
-              <a:t>'react-redux'</a:t>
-            </a:r>
-            <a:br>
-              <a:rPr lang="en-US" b="1" dirty="0">
-                <a:solidFill>
-                  <a:srgbClr val="008000"/>
-                </a:solidFill>
-              </a:rPr>
-            </a:br>
-            <a:r>
-              <a:rPr lang="en-US" b="1" dirty="0">
-                <a:solidFill>
-                  <a:srgbClr val="000080"/>
-                </a:solidFill>
-              </a:rPr>
-              <a:t>import </a:t>
-            </a:r>
-            <a:r>
-              <a:rPr lang="en-US" dirty="0"/>
-              <a:t>{ </a:t>
-            </a:r>
-            <a:r>
-              <a:rPr lang="en-US" b="1" dirty="0" err="1">
-                <a:solidFill>
-                  <a:srgbClr val="660E7A"/>
-                </a:solidFill>
-              </a:rPr>
-              <a:t>createStore</a:t>
-            </a:r>
-            <a:r>
-              <a:rPr lang="en-US" b="1" dirty="0">
-                <a:solidFill>
-                  <a:srgbClr val="660E7A"/>
-                </a:solidFill>
-              </a:rPr>
-              <a:t> </a:t>
-            </a:r>
-            <a:r>
-              <a:rPr lang="en-US" dirty="0"/>
-              <a:t>} </a:t>
-            </a:r>
-            <a:r>
-              <a:rPr lang="en-US" b="1" dirty="0">
-                <a:solidFill>
-                  <a:srgbClr val="000080"/>
-                </a:solidFill>
-              </a:rPr>
-              <a:t>from </a:t>
-            </a:r>
-            <a:r>
-              <a:rPr lang="en-US" b="1" dirty="0">
-                <a:solidFill>
-                  <a:srgbClr val="008000"/>
-                </a:solidFill>
-              </a:rPr>
-              <a:t>'redux'</a:t>
-            </a:r>
-            <a:br>
-              <a:rPr lang="en-US" b="1" dirty="0">
-                <a:solidFill>
-                  <a:srgbClr val="008000"/>
-                </a:solidFill>
-              </a:rPr>
-            </a:br>
-            <a:r>
-              <a:rPr lang="en-US" b="1" dirty="0">
-                <a:solidFill>
-                  <a:srgbClr val="000080"/>
-                </a:solidFill>
-              </a:rPr>
-              <a:t>import </a:t>
-            </a:r>
-            <a:r>
-              <a:rPr lang="en-US" i="1" dirty="0" err="1" smtClean="0"/>
-              <a:t>quoteReducer</a:t>
-            </a:r>
-            <a:r>
-              <a:rPr lang="en-US" i="1" dirty="0" smtClean="0"/>
-              <a:t> </a:t>
-            </a:r>
-            <a:r>
-              <a:rPr lang="en-US" b="1" dirty="0">
-                <a:solidFill>
-                  <a:srgbClr val="000080"/>
-                </a:solidFill>
-              </a:rPr>
-              <a:t>from </a:t>
-            </a:r>
-            <a:r>
-              <a:rPr lang="en-US" b="1" dirty="0" smtClean="0">
-                <a:solidFill>
-                  <a:srgbClr val="008000"/>
-                </a:solidFill>
-              </a:rPr>
-              <a:t>'./quotes/</a:t>
-            </a:r>
-            <a:r>
-              <a:rPr lang="en-US" b="1" dirty="0" err="1" smtClean="0">
-                <a:solidFill>
-                  <a:srgbClr val="008000"/>
-                </a:solidFill>
-              </a:rPr>
-              <a:t>quoteReducer</a:t>
-            </a:r>
-            <a:r>
-              <a:rPr lang="en-US" b="1" dirty="0" smtClean="0">
-                <a:solidFill>
-                  <a:srgbClr val="008000"/>
-                </a:solidFill>
-              </a:rPr>
-              <a:t>'</a:t>
-            </a:r>
-            <a:r>
-              <a:rPr lang="en-US" b="1" dirty="0">
-                <a:solidFill>
-                  <a:srgbClr val="008000"/>
-                </a:solidFill>
-              </a:rPr>
-              <a:t/>
-            </a:r>
-            <a:br>
-              <a:rPr lang="en-US" b="1" dirty="0">
-                <a:solidFill>
-                  <a:srgbClr val="008000"/>
-                </a:solidFill>
-              </a:rPr>
-            </a:br>
-            <a:r>
-              <a:rPr lang="en-US" b="1" dirty="0">
-                <a:solidFill>
-                  <a:srgbClr val="008000"/>
-                </a:solidFill>
-              </a:rPr>
-              <a:t/>
-            </a:r>
-            <a:br>
-              <a:rPr lang="en-US" b="1" dirty="0">
-                <a:solidFill>
-                  <a:srgbClr val="008000"/>
-                </a:solidFill>
-              </a:rPr>
-            </a:br>
-            <a:r>
-              <a:rPr lang="en-US" b="1" dirty="0">
-                <a:solidFill>
-                  <a:srgbClr val="000080"/>
-                </a:solidFill>
-              </a:rPr>
-              <a:t>let </a:t>
-            </a:r>
-            <a:r>
-              <a:rPr lang="en-US" b="1" i="1" dirty="0">
-                <a:solidFill>
-                  <a:srgbClr val="660E7A"/>
-                </a:solidFill>
-              </a:rPr>
-              <a:t>store </a:t>
-            </a:r>
-            <a:r>
-              <a:rPr lang="en-US" dirty="0"/>
-              <a:t>= </a:t>
-            </a:r>
-            <a:r>
-              <a:rPr lang="en-US" b="1" dirty="0" err="1" smtClean="0">
-                <a:solidFill>
-                  <a:srgbClr val="660E7A"/>
-                </a:solidFill>
-              </a:rPr>
-              <a:t>createStore</a:t>
-            </a:r>
-            <a:r>
-              <a:rPr lang="en-US" dirty="0" smtClean="0"/>
-              <a:t>(</a:t>
-            </a:r>
-            <a:r>
-              <a:rPr lang="en-US" dirty="0" err="1" smtClean="0"/>
-              <a:t>quoteReducer</a:t>
-            </a:r>
-            <a:r>
-              <a:rPr lang="en-US" dirty="0"/>
-              <a:t>)</a:t>
             </a:r>
             <a:br>
               <a:rPr lang="en-US" dirty="0"/>
             </a:br>
             <a:r>
               <a:rPr lang="en-US" dirty="0"/>
-              <a:t/>
+              <a:t>   </a:t>
+            </a:r>
+            <a:r>
+              <a:rPr lang="en-US" b="1" dirty="0">
+                <a:solidFill>
+                  <a:srgbClr val="0000FF"/>
+                </a:solidFill>
+              </a:rPr>
+              <a:t>quote</a:t>
+            </a:r>
+            <a:r>
+              <a:rPr lang="en-US" b="1" dirty="0">
+                <a:solidFill>
+                  <a:srgbClr val="008000"/>
+                </a:solidFill>
+              </a:rPr>
+              <a:t>=</a:t>
+            </a:r>
+            <a:r>
+              <a:rPr lang="en-US" dirty="0"/>
+              <a:t>{</a:t>
+            </a:r>
+            <a:r>
+              <a:rPr lang="en-US" dirty="0" err="1"/>
+              <a:t>quoteValue</a:t>
+            </a:r>
+            <a:r>
+              <a:rPr lang="en-US" dirty="0"/>
+              <a:t>}</a:t>
             </a:r>
             <a:br>
               <a:rPr lang="en-US" dirty="0"/>
             </a:br>
             <a:r>
-              <a:rPr lang="en-US" b="1" i="1" dirty="0" err="1">
-                <a:solidFill>
-                  <a:srgbClr val="660E7A"/>
-                </a:solidFill>
-              </a:rPr>
-              <a:t>store</a:t>
-            </a:r>
-            <a:r>
-              <a:rPr lang="en-US" dirty="0" err="1"/>
-              <a:t>.</a:t>
-            </a:r>
-            <a:r>
-              <a:rPr lang="en-US" dirty="0" err="1">
-                <a:solidFill>
-                  <a:srgbClr val="7A7A43"/>
-                </a:solidFill>
-              </a:rPr>
-              <a:t>subscribe</a:t>
-            </a:r>
-            <a:r>
               <a:rPr lang="en-US" dirty="0"/>
-              <a:t>(() =&gt;</a:t>
-            </a:r>
-            <a:br>
-              <a:rPr lang="en-US" dirty="0"/>
-            </a:br>
-            <a:r>
-              <a:rPr lang="en-US" dirty="0"/>
-              <a:t>  </a:t>
-            </a:r>
-            <a:r>
-              <a:rPr lang="en-US" b="1" dirty="0" err="1">
-                <a:solidFill>
-                  <a:srgbClr val="660E7A"/>
-                </a:solidFill>
-              </a:rPr>
-              <a:t>console</a:t>
-            </a:r>
-            <a:r>
-              <a:rPr lang="en-US" dirty="0" err="1"/>
-              <a:t>.</a:t>
-            </a:r>
-            <a:r>
-              <a:rPr lang="en-US" dirty="0" err="1">
-                <a:solidFill>
-                  <a:srgbClr val="7A7A43"/>
-                </a:solidFill>
-              </a:rPr>
-              <a:t>log</a:t>
-            </a:r>
-            <a:r>
-              <a:rPr lang="en-US" dirty="0"/>
-              <a:t>(</a:t>
-            </a:r>
-            <a:r>
-              <a:rPr lang="en-US" b="1" i="1" dirty="0" err="1">
-                <a:solidFill>
-                  <a:srgbClr val="660E7A"/>
-                </a:solidFill>
-              </a:rPr>
-              <a:t>store</a:t>
-            </a:r>
-            <a:r>
-              <a:rPr lang="en-US" dirty="0" err="1"/>
-              <a:t>.</a:t>
-            </a:r>
-            <a:r>
-              <a:rPr lang="en-US" dirty="0" err="1">
-                <a:solidFill>
-                  <a:srgbClr val="7A7A43"/>
-                </a:solidFill>
-              </a:rPr>
-              <a:t>getState</a:t>
-            </a:r>
-            <a:r>
-              <a:rPr lang="en-US" dirty="0"/>
-              <a:t>())</a:t>
-            </a:r>
-            <a:br>
-              <a:rPr lang="en-US" dirty="0"/>
-            </a:br>
-            <a:r>
-              <a:rPr lang="en-US" dirty="0"/>
-              <a:t>)</a:t>
-            </a:r>
-            <a:br>
-              <a:rPr lang="en-US" dirty="0"/>
-            </a:br>
-            <a:r>
-              <a:rPr lang="en-US" dirty="0"/>
-              <a:t/>
-            </a:r>
-            <a:br>
-              <a:rPr lang="en-US" dirty="0"/>
-            </a:br>
-            <a:r>
-              <a:rPr lang="en-US" dirty="0" err="1"/>
-              <a:t>ReactDOM.</a:t>
-            </a:r>
-            <a:r>
-              <a:rPr lang="en-US" b="1" dirty="0" err="1">
-                <a:solidFill>
-                  <a:srgbClr val="660E7A"/>
-                </a:solidFill>
-              </a:rPr>
-              <a:t>render</a:t>
-            </a:r>
-            <a:r>
-              <a:rPr lang="en-US" dirty="0"/>
-              <a:t>(</a:t>
-            </a:r>
-            <a:br>
-              <a:rPr lang="en-US" dirty="0"/>
-            </a:br>
-            <a:r>
-              <a:rPr lang="en-US" dirty="0"/>
-              <a:t>  &lt;</a:t>
-            </a:r>
-            <a:r>
-              <a:rPr lang="en-US" b="1" dirty="0">
-                <a:solidFill>
-                  <a:srgbClr val="000080"/>
-                </a:solidFill>
-              </a:rPr>
-              <a:t>Provider </a:t>
-            </a:r>
-            <a:r>
-              <a:rPr lang="en-US" b="1" dirty="0">
+              <a:t>   </a:t>
+            </a:r>
+            <a:r>
+              <a:rPr lang="en-US" b="1" dirty="0" err="1" smtClean="0">
                 <a:solidFill>
                   <a:srgbClr val="0000FF"/>
                 </a:solidFill>
               </a:rPr>
-              <a:t>store</a:t>
-            </a:r>
-            <a:r>
-              <a:rPr lang="en-US" b="1" dirty="0">
+              <a:t>saveQuote</a:t>
+            </a:r>
+            <a:r>
+              <a:rPr lang="en-US" b="1" dirty="0" smtClean="0">
                 <a:solidFill>
                   <a:srgbClr val="008000"/>
                 </a:solidFill>
@@ -15005,113 +14771,121 @@
               <a:t>=</a:t>
             </a:r>
             <a:r>
-              <a:rPr lang="en-US" dirty="0"/>
+              <a:rPr lang="en-US" dirty="0" smtClean="0"/>
               <a:t>{</a:t>
             </a:r>
             <a:r>
-              <a:rPr lang="en-US" b="1" i="1" dirty="0">
-                <a:solidFill>
-                  <a:srgbClr val="660E7A"/>
-                </a:solidFill>
-              </a:rPr>
-              <a:t>store</a:t>
-            </a:r>
-            <a:r>
-              <a:rPr lang="en-US" dirty="0"/>
-              <a:t>}&gt;</a:t>
-            </a:r>
-            <a:br>
-              <a:rPr lang="en-US" dirty="0"/>
-            </a:br>
-            <a:r>
-              <a:rPr lang="en-US" dirty="0"/>
-              <a:t>    &lt;</a:t>
-            </a:r>
-            <a:r>
-              <a:rPr lang="en-US" b="1" dirty="0">
-                <a:solidFill>
-                  <a:srgbClr val="000080"/>
-                </a:solidFill>
-              </a:rPr>
-              <a:t>App </a:t>
+              <a:rPr lang="en-US" dirty="0" err="1" smtClean="0"/>
+              <a:t>saveQuote</a:t>
+            </a:r>
+            <a:r>
+              <a:rPr lang="en-US" dirty="0" smtClean="0"/>
+              <a:t>} </a:t>
             </a:r>
             <a:r>
               <a:rPr lang="en-US" dirty="0"/>
               <a:t>/&gt;</a:t>
             </a:r>
-            <a:br>
-              <a:rPr lang="en-US" dirty="0"/>
-            </a:br>
-            <a:r>
-              <a:rPr lang="en-US" dirty="0"/>
-              <a:t>  &lt;/</a:t>
-            </a:r>
-            <a:r>
-              <a:rPr lang="en-US" b="1" dirty="0">
-                <a:solidFill>
-                  <a:srgbClr val="000080"/>
-                </a:solidFill>
-              </a:rPr>
-              <a:t>Provider</a:t>
-            </a:r>
-            <a:r>
-              <a:rPr lang="en-US" dirty="0"/>
-              <a:t>&gt;,</a:t>
-            </a:r>
-            <a:br>
-              <a:rPr lang="en-US" dirty="0"/>
-            </a:br>
-            <a:r>
-              <a:rPr lang="en-US" dirty="0"/>
-              <a:t>  </a:t>
-            </a:r>
-            <a:r>
-              <a:rPr lang="en-US" b="1" dirty="0" err="1">
-                <a:solidFill>
-                  <a:srgbClr val="660E7A"/>
-                </a:solidFill>
-              </a:rPr>
-              <a:t>document</a:t>
-            </a:r>
-            <a:r>
-              <a:rPr lang="en-US" dirty="0" err="1"/>
-              <a:t>.</a:t>
-            </a:r>
-            <a:r>
-              <a:rPr lang="en-US" dirty="0" err="1">
-                <a:solidFill>
-                  <a:srgbClr val="7A7A43"/>
-                </a:solidFill>
-              </a:rPr>
-              <a:t>getElementById</a:t>
-            </a:r>
-            <a:r>
-              <a:rPr lang="en-US" dirty="0"/>
-              <a:t>(</a:t>
-            </a:r>
-            <a:r>
-              <a:rPr lang="en-US" b="1" dirty="0">
-                <a:solidFill>
-                  <a:srgbClr val="008000"/>
-                </a:solidFill>
-              </a:rPr>
-              <a:t>'root'</a:t>
-            </a:r>
-            <a:r>
-              <a:rPr lang="en-US" dirty="0"/>
-              <a:t>)</a:t>
-            </a:r>
-            <a:br>
-              <a:rPr lang="en-US" dirty="0"/>
-            </a:br>
-            <a:r>
-              <a:rPr lang="en-US" dirty="0"/>
-              <a:t>);</a:t>
-            </a:r>
-            <a:br>
-              <a:rPr lang="en-US" dirty="0"/>
-            </a:br>
+          </a:p>
+          <a:p>
+            <a:pPr marL="342900" indent="-342900">
+              <a:buFont typeface="Arial" charset="0"/>
+              <a:buChar char="•"/>
+            </a:pPr>
+            <a:r>
+              <a:rPr lang="en-US" dirty="0" smtClean="0"/>
+              <a:t>We have to map the </a:t>
+            </a:r>
+            <a:r>
+              <a:rPr lang="en-US" dirty="0" smtClean="0">
+                <a:solidFill>
+                  <a:srgbClr val="FF0000"/>
+                </a:solidFill>
+              </a:rPr>
+              <a:t>STATE</a:t>
+            </a:r>
+            <a:r>
+              <a:rPr lang="en-US" dirty="0" smtClean="0"/>
+              <a:t> properties to our </a:t>
+            </a:r>
+            <a:r>
+              <a:rPr lang="en-US" dirty="0" smtClean="0">
+                <a:solidFill>
+                  <a:srgbClr val="FF0000"/>
+                </a:solidFill>
+              </a:rPr>
+              <a:t>name</a:t>
+            </a:r>
+            <a:r>
+              <a:rPr lang="en-US" dirty="0" smtClean="0"/>
+              <a:t> and </a:t>
+            </a:r>
+            <a:r>
+              <a:rPr lang="en-US" dirty="0" smtClean="0">
+                <a:solidFill>
+                  <a:srgbClr val="FF0000"/>
+                </a:solidFill>
+              </a:rPr>
+              <a:t>quote</a:t>
+            </a:r>
+            <a:r>
+              <a:rPr lang="en-US" dirty="0" smtClean="0"/>
+              <a:t> attributes</a:t>
+            </a:r>
+          </a:p>
+          <a:p>
+            <a:pPr marL="342900" indent="-342900">
+              <a:buFont typeface="Arial" charset="0"/>
+              <a:buChar char="•"/>
+            </a:pPr>
+            <a:r>
+              <a:rPr lang="en-US" dirty="0" smtClean="0"/>
+              <a:t>We have to map the </a:t>
+            </a:r>
+            <a:r>
+              <a:rPr lang="en-US" dirty="0" err="1" smtClean="0">
+                <a:solidFill>
+                  <a:srgbClr val="FF0000"/>
+                </a:solidFill>
+              </a:rPr>
+              <a:t>saveQuote</a:t>
+            </a:r>
+            <a:r>
+              <a:rPr lang="en-US" dirty="0" smtClean="0">
+                <a:solidFill>
+                  <a:srgbClr val="FF0000"/>
+                </a:solidFill>
+              </a:rPr>
+              <a:t> </a:t>
+            </a:r>
+            <a:r>
+              <a:rPr lang="en-US" dirty="0" smtClean="0"/>
+              <a:t>attribute to our callback </a:t>
+            </a:r>
             <a:endParaRPr lang="en-US" dirty="0" smtClean="0"/>
+          </a:p>
+          <a:p>
+            <a:pPr marL="631825" lvl="1" indent="-342900">
+              <a:buFont typeface="Arial" charset="0"/>
+              <a:buChar char="•"/>
+            </a:pPr>
+            <a:r>
+              <a:rPr lang="en-US" dirty="0" smtClean="0"/>
+              <a:t>Callback calls </a:t>
+            </a:r>
+            <a:r>
+              <a:rPr lang="en-US" dirty="0" smtClean="0">
+                <a:solidFill>
+                  <a:srgbClr val="FF0000"/>
+                </a:solidFill>
+              </a:rPr>
+              <a:t>dispatch()</a:t>
+            </a:r>
+            <a:r>
+              <a:rPr lang="en-US" dirty="0" smtClean="0"/>
+              <a:t> with some Action</a:t>
+            </a:r>
+            <a:endParaRPr lang="en-US" dirty="0"/>
           </a:p>
         </p:txBody>
       </p:sp>
@@ -15132,7 +14906,609 @@
           <a:p>
             <a:r>
               <a:rPr lang="en-US" dirty="0" smtClean="0"/>
-              <a:t>Configure the Store </a:t>
+              <a:t>Configure Redux</a:t>
+            </a:r>
+            <a:endParaRPr lang="en-US" dirty="0"/>
+          </a:p>
+        </p:txBody>
+      </p:sp>
+    </p:spTree>
+    <p:extLst>
+      <p:ext uri="{BB962C8B-B14F-4D97-AF65-F5344CB8AC3E}">
+        <p14:creationId xmlns:p14="http://schemas.microsoft.com/office/powerpoint/2010/main" val="1192198151"/>
+      </p:ext>
+    </p:extLst>
+  </p:cSld>
+  <p:clrMapOvr>
+    <a:masterClrMapping/>
+  </p:clrMapOvr>
+  <mc:AlternateContent xmlns:mc="http://schemas.openxmlformats.org/markup-compatibility/2006" xmlns:p14="http://schemas.microsoft.com/office/powerpoint/2010/main">
+    <mc:Choice Requires="p14">
+      <p:transition p14:dur="0"/>
+    </mc:Choice>
+    <mc:Fallback xmlns="">
+      <p:transition/>
+    </mc:Fallback>
+  </mc:AlternateContent>
+  <p:timing>
+    <p:tnLst>
+      <p:par>
+        <p:cTn id="1" dur="indefinite" restart="never" nodeType="tmRoot"/>
+      </p:par>
+    </p:tnLst>
+  </p:timing>
+</p:sld>
+</file>
+
+<file path=ppt/slides/slide19.xml><?xml version="1.0" encoding="utf-8"?>
+<p:sld xmlns:a="http://schemas.openxmlformats.org/drawingml/2006/main" xmlns:r="http://schemas.openxmlformats.org/officeDocument/2006/relationships" xmlns:p="http://schemas.openxmlformats.org/presentationml/2006/main">
+  <p:cSld>
+    <p:spTree>
+      <p:nvGrpSpPr>
+        <p:cNvPr id="1" name=""/>
+        <p:cNvGrpSpPr/>
+        <p:nvPr/>
+      </p:nvGrpSpPr>
+      <p:grpSpPr>
+        <a:xfrm>
+          <a:off x="0" y="0"/>
+          <a:ext cx="0" cy="0"/>
+          <a:chOff x="0" y="0"/>
+          <a:chExt cx="0" cy="0"/>
+        </a:xfrm>
+      </p:grpSpPr>
+      <p:sp>
+        <p:nvSpPr>
+          <p:cNvPr id="2" name="Text Placeholder 1"/>
+          <p:cNvSpPr>
+            <a:spLocks noGrp="1"/>
+          </p:cNvSpPr>
+          <p:nvPr>
+            <p:ph type="body" sz="quarter" idx="12"/>
+          </p:nvPr>
+        </p:nvSpPr>
+        <p:spPr/>
+        <p:txBody>
+          <a:bodyPr/>
+          <a:lstStyle/>
+          <a:p>
+            <a:pPr marL="342900" indent="-342900">
+              <a:buFont typeface="Arial" charset="0"/>
+              <a:buChar char="•"/>
+            </a:pPr>
+            <a:r>
+              <a:rPr lang="en-US" dirty="0" smtClean="0"/>
+              <a:t>File </a:t>
+            </a:r>
+            <a:r>
+              <a:rPr lang="en-US" dirty="0" smtClean="0">
+                <a:sym typeface="Wingdings"/>
+              </a:rPr>
+              <a:t> </a:t>
+            </a:r>
+            <a:r>
+              <a:rPr lang="en-US" dirty="0" err="1" smtClean="0">
+                <a:solidFill>
+                  <a:srgbClr val="FF0000"/>
+                </a:solidFill>
+                <a:sym typeface="Wingdings"/>
+              </a:rPr>
+              <a:t>index.js</a:t>
+            </a:r>
+            <a:r>
+              <a:rPr lang="en-US" dirty="0" smtClean="0">
+                <a:sym typeface="Wingdings"/>
+              </a:rPr>
+              <a:t> </a:t>
+            </a:r>
+          </a:p>
+          <a:p>
+            <a:pPr marL="631825" lvl="1" indent="-342900">
+              <a:buFont typeface="Arial" charset="0"/>
+              <a:buChar char="•"/>
+            </a:pPr>
+            <a:r>
+              <a:rPr lang="en-US" b="1" dirty="0">
+                <a:solidFill>
+                  <a:srgbClr val="000080"/>
+                </a:solidFill>
+              </a:rPr>
+              <a:t>import </a:t>
+            </a:r>
+            <a:r>
+              <a:rPr lang="en-US" dirty="0"/>
+              <a:t>{ </a:t>
+            </a:r>
+            <a:r>
+              <a:rPr lang="en-US" b="1" dirty="0">
+                <a:solidFill>
+                  <a:srgbClr val="660E7A"/>
+                </a:solidFill>
+              </a:rPr>
+              <a:t>Provider </a:t>
+            </a:r>
+            <a:r>
+              <a:rPr lang="en-US" dirty="0"/>
+              <a:t>} </a:t>
+            </a:r>
+            <a:r>
+              <a:rPr lang="en-US" b="1" dirty="0">
+                <a:solidFill>
+                  <a:srgbClr val="000080"/>
+                </a:solidFill>
+              </a:rPr>
+              <a:t>from </a:t>
+            </a:r>
+            <a:r>
+              <a:rPr lang="en-US" b="1" dirty="0">
+                <a:solidFill>
+                  <a:srgbClr val="008000"/>
+                </a:solidFill>
+              </a:rPr>
+              <a:t>'react-redux'</a:t>
+            </a:r>
+            <a:br>
+              <a:rPr lang="en-US" b="1" dirty="0">
+                <a:solidFill>
+                  <a:srgbClr val="008000"/>
+                </a:solidFill>
+              </a:rPr>
+            </a:br>
+            <a:r>
+              <a:rPr lang="en-US" b="1" dirty="0">
+                <a:solidFill>
+                  <a:srgbClr val="000080"/>
+                </a:solidFill>
+              </a:rPr>
+              <a:t>import </a:t>
+            </a:r>
+            <a:r>
+              <a:rPr lang="en-US" dirty="0"/>
+              <a:t>{ </a:t>
+            </a:r>
+            <a:r>
+              <a:rPr lang="en-US" b="1" dirty="0" err="1">
+                <a:solidFill>
+                  <a:srgbClr val="660E7A"/>
+                </a:solidFill>
+              </a:rPr>
+              <a:t>createStore</a:t>
+            </a:r>
+            <a:r>
+              <a:rPr lang="en-US" b="1" dirty="0">
+                <a:solidFill>
+                  <a:srgbClr val="660E7A"/>
+                </a:solidFill>
+              </a:rPr>
+              <a:t> </a:t>
+            </a:r>
+            <a:r>
+              <a:rPr lang="en-US" dirty="0"/>
+              <a:t>} </a:t>
+            </a:r>
+            <a:r>
+              <a:rPr lang="en-US" b="1" dirty="0">
+                <a:solidFill>
+                  <a:srgbClr val="000080"/>
+                </a:solidFill>
+              </a:rPr>
+              <a:t>from </a:t>
+            </a:r>
+            <a:r>
+              <a:rPr lang="en-US" b="1" dirty="0">
+                <a:solidFill>
+                  <a:srgbClr val="008000"/>
+                </a:solidFill>
+              </a:rPr>
+              <a:t>'redux'</a:t>
+            </a:r>
+            <a:br>
+              <a:rPr lang="en-US" b="1" dirty="0">
+                <a:solidFill>
+                  <a:srgbClr val="008000"/>
+                </a:solidFill>
+              </a:rPr>
+            </a:br>
+            <a:r>
+              <a:rPr lang="en-US" b="1" dirty="0">
+                <a:solidFill>
+                  <a:srgbClr val="000080"/>
+                </a:solidFill>
+              </a:rPr>
+              <a:t>import </a:t>
+            </a:r>
+            <a:r>
+              <a:rPr lang="en-US" i="1" dirty="0" err="1" smtClean="0"/>
+              <a:t>quoteReducer</a:t>
+            </a:r>
+            <a:r>
+              <a:rPr lang="en-US" i="1" dirty="0" smtClean="0"/>
+              <a:t> </a:t>
+            </a:r>
+            <a:r>
+              <a:rPr lang="en-US" b="1" dirty="0">
+                <a:solidFill>
+                  <a:srgbClr val="000080"/>
+                </a:solidFill>
+              </a:rPr>
+              <a:t>from </a:t>
+            </a:r>
+            <a:r>
+              <a:rPr lang="en-US" b="1" dirty="0" smtClean="0">
+                <a:solidFill>
+                  <a:srgbClr val="008000"/>
+                </a:solidFill>
+              </a:rPr>
+              <a:t>'./quotes/</a:t>
+            </a:r>
+            <a:r>
+              <a:rPr lang="en-US" b="1" dirty="0" err="1" smtClean="0">
+                <a:solidFill>
+                  <a:srgbClr val="008000"/>
+                </a:solidFill>
+              </a:rPr>
+              <a:t>quoteReducer</a:t>
+            </a:r>
+            <a:r>
+              <a:rPr lang="en-US" b="1" dirty="0" smtClean="0">
+                <a:solidFill>
+                  <a:srgbClr val="008000"/>
+                </a:solidFill>
+              </a:rPr>
+              <a:t>'</a:t>
+            </a:r>
+            <a:r>
+              <a:rPr lang="en-US" b="1" dirty="0">
+                <a:solidFill>
+                  <a:srgbClr val="008000"/>
+                </a:solidFill>
+              </a:rPr>
+              <a:t/>
+            </a:r>
+            <a:br>
+              <a:rPr lang="en-US" b="1" dirty="0">
+                <a:solidFill>
+                  <a:srgbClr val="008000"/>
+                </a:solidFill>
+              </a:rPr>
+            </a:br>
+            <a:r>
+              <a:rPr lang="en-US" b="1" dirty="0">
+                <a:solidFill>
+                  <a:srgbClr val="008000"/>
+                </a:solidFill>
+              </a:rPr>
+              <a:t/>
+            </a:r>
+            <a:br>
+              <a:rPr lang="en-US" b="1" dirty="0">
+                <a:solidFill>
+                  <a:srgbClr val="008000"/>
+                </a:solidFill>
+              </a:rPr>
+            </a:br>
+            <a:r>
+              <a:rPr lang="en-US" b="1" dirty="0">
+                <a:solidFill>
+                  <a:srgbClr val="000080"/>
+                </a:solidFill>
+              </a:rPr>
+              <a:t>let </a:t>
+            </a:r>
+            <a:r>
+              <a:rPr lang="en-US" b="1" i="1" dirty="0">
+                <a:solidFill>
+                  <a:srgbClr val="660E7A"/>
+                </a:solidFill>
+              </a:rPr>
+              <a:t>store </a:t>
+            </a:r>
+            <a:r>
+              <a:rPr lang="en-US" dirty="0"/>
+              <a:t>= </a:t>
+            </a:r>
+            <a:r>
+              <a:rPr lang="en-US" b="1" dirty="0" err="1" smtClean="0">
+                <a:solidFill>
+                  <a:srgbClr val="660E7A"/>
+                </a:solidFill>
+              </a:rPr>
+              <a:t>createStore</a:t>
+            </a:r>
+            <a:r>
+              <a:rPr lang="en-US" dirty="0" smtClean="0"/>
+              <a:t>(</a:t>
+            </a:r>
+            <a:r>
+              <a:rPr lang="en-US" dirty="0" err="1" smtClean="0"/>
+              <a:t>quoteReducer</a:t>
+            </a:r>
+            <a:r>
+              <a:rPr lang="en-US" dirty="0"/>
+              <a:t>)</a:t>
+            </a:r>
+            <a:br>
+              <a:rPr lang="en-US" dirty="0"/>
+            </a:br>
+            <a:r>
+              <a:rPr lang="en-US" dirty="0"/>
+              <a:t/>
+            </a:r>
+            <a:br>
+              <a:rPr lang="en-US" dirty="0"/>
+            </a:br>
+            <a:r>
+              <a:rPr lang="en-US" b="1" i="1" dirty="0" err="1">
+                <a:solidFill>
+                  <a:srgbClr val="660E7A"/>
+                </a:solidFill>
+              </a:rPr>
+              <a:t>store</a:t>
+            </a:r>
+            <a:r>
+              <a:rPr lang="en-US" dirty="0" err="1"/>
+              <a:t>.</a:t>
+            </a:r>
+            <a:r>
+              <a:rPr lang="en-US" dirty="0" err="1">
+                <a:solidFill>
+                  <a:srgbClr val="7A7A43"/>
+                </a:solidFill>
+              </a:rPr>
+              <a:t>subscribe</a:t>
+            </a:r>
+            <a:r>
+              <a:rPr lang="en-US" dirty="0"/>
+              <a:t>(() =&gt;</a:t>
+            </a:r>
+            <a:br>
+              <a:rPr lang="en-US" dirty="0"/>
+            </a:br>
+            <a:r>
+              <a:rPr lang="en-US" dirty="0"/>
+              <a:t>  </a:t>
+            </a:r>
+            <a:r>
+              <a:rPr lang="en-US" b="1" dirty="0" err="1">
+                <a:solidFill>
+                  <a:srgbClr val="660E7A"/>
+                </a:solidFill>
+              </a:rPr>
+              <a:t>console</a:t>
+            </a:r>
+            <a:r>
+              <a:rPr lang="en-US" dirty="0" err="1"/>
+              <a:t>.</a:t>
+            </a:r>
+            <a:r>
+              <a:rPr lang="en-US" dirty="0" err="1">
+                <a:solidFill>
+                  <a:srgbClr val="7A7A43"/>
+                </a:solidFill>
+              </a:rPr>
+              <a:t>log</a:t>
+            </a:r>
+            <a:r>
+              <a:rPr lang="en-US" dirty="0"/>
+              <a:t>(</a:t>
+            </a:r>
+            <a:r>
+              <a:rPr lang="en-US" b="1" i="1" dirty="0" err="1">
+                <a:solidFill>
+                  <a:srgbClr val="660E7A"/>
+                </a:solidFill>
+              </a:rPr>
+              <a:t>store</a:t>
+            </a:r>
+            <a:r>
+              <a:rPr lang="en-US" dirty="0" err="1"/>
+              <a:t>.</a:t>
+            </a:r>
+            <a:r>
+              <a:rPr lang="en-US" dirty="0" err="1">
+                <a:solidFill>
+                  <a:srgbClr val="7A7A43"/>
+                </a:solidFill>
+              </a:rPr>
+              <a:t>getState</a:t>
+            </a:r>
+            <a:r>
+              <a:rPr lang="en-US" dirty="0"/>
+              <a:t>())</a:t>
+            </a:r>
+            <a:br>
+              <a:rPr lang="en-US" dirty="0"/>
+            </a:br>
+            <a:r>
+              <a:rPr lang="en-US" dirty="0"/>
+              <a:t>)</a:t>
+            </a:r>
+            <a:br>
+              <a:rPr lang="en-US" dirty="0"/>
+            </a:br>
+            <a:r>
+              <a:rPr lang="en-US" dirty="0"/>
+              <a:t/>
+            </a:r>
+            <a:br>
+              <a:rPr lang="en-US" dirty="0"/>
+            </a:br>
+            <a:r>
+              <a:rPr lang="en-US" dirty="0" err="1"/>
+              <a:t>ReactDOM.</a:t>
+            </a:r>
+            <a:r>
+              <a:rPr lang="en-US" b="1" dirty="0" err="1">
+                <a:solidFill>
+                  <a:srgbClr val="660E7A"/>
+                </a:solidFill>
+              </a:rPr>
+              <a:t>render</a:t>
+            </a:r>
+            <a:r>
+              <a:rPr lang="en-US" dirty="0"/>
+              <a:t>(</a:t>
+            </a:r>
+            <a:br>
+              <a:rPr lang="en-US" dirty="0"/>
+            </a:br>
+            <a:r>
+              <a:rPr lang="en-US" dirty="0"/>
+              <a:t>  &lt;</a:t>
+            </a:r>
+            <a:r>
+              <a:rPr lang="en-US" b="1" dirty="0">
+                <a:solidFill>
+                  <a:srgbClr val="000080"/>
+                </a:solidFill>
+              </a:rPr>
+              <a:t>Provider </a:t>
+            </a:r>
+            <a:r>
+              <a:rPr lang="en-US" b="1" dirty="0">
+                <a:solidFill>
+                  <a:srgbClr val="0000FF"/>
+                </a:solidFill>
+              </a:rPr>
+              <a:t>store</a:t>
+            </a:r>
+            <a:r>
+              <a:rPr lang="en-US" b="1" dirty="0">
+                <a:solidFill>
+                  <a:srgbClr val="008000"/>
+                </a:solidFill>
+              </a:rPr>
+              <a:t>=</a:t>
+            </a:r>
+            <a:r>
+              <a:rPr lang="en-US" dirty="0"/>
+              <a:t>{</a:t>
+            </a:r>
+            <a:r>
+              <a:rPr lang="en-US" b="1" i="1" dirty="0">
+                <a:solidFill>
+                  <a:srgbClr val="660E7A"/>
+                </a:solidFill>
+              </a:rPr>
+              <a:t>store</a:t>
+            </a:r>
+            <a:r>
+              <a:rPr lang="en-US" dirty="0"/>
+              <a:t>}&gt;</a:t>
+            </a:r>
+            <a:br>
+              <a:rPr lang="en-US" dirty="0"/>
+            </a:br>
+            <a:r>
+              <a:rPr lang="en-US" dirty="0"/>
+              <a:t>    &lt;</a:t>
+            </a:r>
+            <a:r>
+              <a:rPr lang="en-US" b="1" dirty="0">
+                <a:solidFill>
+                  <a:srgbClr val="000080"/>
+                </a:solidFill>
+              </a:rPr>
+              <a:t>App </a:t>
+            </a:r>
+            <a:r>
+              <a:rPr lang="en-US" dirty="0"/>
+              <a:t>/&gt;</a:t>
+            </a:r>
+            <a:br>
+              <a:rPr lang="en-US" dirty="0"/>
+            </a:br>
+            <a:r>
+              <a:rPr lang="en-US" dirty="0"/>
+              <a:t>  &lt;/</a:t>
+            </a:r>
+            <a:r>
+              <a:rPr lang="en-US" b="1" dirty="0">
+                <a:solidFill>
+                  <a:srgbClr val="000080"/>
+                </a:solidFill>
+              </a:rPr>
+              <a:t>Provider</a:t>
+            </a:r>
+            <a:r>
+              <a:rPr lang="en-US" dirty="0"/>
+              <a:t>&gt;,</a:t>
+            </a:r>
+            <a:br>
+              <a:rPr lang="en-US" dirty="0"/>
+            </a:br>
+            <a:r>
+              <a:rPr lang="en-US" dirty="0"/>
+              <a:t>  </a:t>
+            </a:r>
+            <a:r>
+              <a:rPr lang="en-US" b="1" dirty="0" err="1">
+                <a:solidFill>
+                  <a:srgbClr val="660E7A"/>
+                </a:solidFill>
+              </a:rPr>
+              <a:t>document</a:t>
+            </a:r>
+            <a:r>
+              <a:rPr lang="en-US" dirty="0" err="1"/>
+              <a:t>.</a:t>
+            </a:r>
+            <a:r>
+              <a:rPr lang="en-US" dirty="0" err="1">
+                <a:solidFill>
+                  <a:srgbClr val="7A7A43"/>
+                </a:solidFill>
+              </a:rPr>
+              <a:t>getElementById</a:t>
+            </a:r>
+            <a:r>
+              <a:rPr lang="en-US" dirty="0"/>
+              <a:t>(</a:t>
+            </a:r>
+            <a:r>
+              <a:rPr lang="en-US" b="1" dirty="0">
+                <a:solidFill>
+                  <a:srgbClr val="008000"/>
+                </a:solidFill>
+              </a:rPr>
+              <a:t>'root'</a:t>
+            </a:r>
+            <a:r>
+              <a:rPr lang="en-US" dirty="0"/>
+              <a:t>)</a:t>
+            </a:r>
+            <a:br>
+              <a:rPr lang="en-US" dirty="0"/>
+            </a:br>
+            <a:r>
+              <a:rPr lang="en-US" dirty="0"/>
+              <a:t>);</a:t>
+            </a:r>
+            <a:br>
+              <a:rPr lang="en-US" dirty="0"/>
+            </a:br>
+            <a:endParaRPr lang="en-US" dirty="0" smtClean="0"/>
+          </a:p>
+        </p:txBody>
+      </p:sp>
+      <p:sp>
+        <p:nvSpPr>
+          <p:cNvPr id="3" name="Title 2"/>
+          <p:cNvSpPr>
+            <a:spLocks noGrp="1"/>
+          </p:cNvSpPr>
+          <p:nvPr>
+            <p:ph type="title"/>
+          </p:nvPr>
+        </p:nvSpPr>
+        <p:spPr/>
+        <p:txBody>
+          <a:bodyPr/>
+          <a:lstStyle/>
+          <a:p>
+            <a:r>
+              <a:rPr lang="en-US" dirty="0" smtClean="0"/>
+              <a:t>Configuring Redux </a:t>
             </a:r>
             <a:r>
               <a:rPr lang="mr-IN" dirty="0" smtClean="0"/>
@@ -15465,7 +15841,338 @@
 </p:sld>
 </file>
 
-<file path=ppt/slides/slide19.xml><?xml version="1.0" encoding="utf-8"?>
+<file path=ppt/slides/slide2.xml><?xml version="1.0" encoding="utf-8"?>
+<p:sld xmlns:a="http://schemas.openxmlformats.org/drawingml/2006/main" xmlns:r="http://schemas.openxmlformats.org/officeDocument/2006/relationships" xmlns:p="http://schemas.openxmlformats.org/presentationml/2006/main">
+  <p:cSld>
+    <p:spTree>
+      <p:nvGrpSpPr>
+        <p:cNvPr id="1" name=""/>
+        <p:cNvGrpSpPr/>
+        <p:nvPr/>
+      </p:nvGrpSpPr>
+      <p:grpSpPr>
+        <a:xfrm>
+          <a:off x="0" y="0"/>
+          <a:ext cx="0" cy="0"/>
+          <a:chOff x="0" y="0"/>
+          <a:chExt cx="0" cy="0"/>
+        </a:xfrm>
+      </p:grpSpPr>
+      <p:sp>
+        <p:nvSpPr>
+          <p:cNvPr id="2" name="Text Placeholder 1"/>
+          <p:cNvSpPr>
+            <a:spLocks noGrp="1"/>
+          </p:cNvSpPr>
+          <p:nvPr>
+            <p:ph type="body" sz="quarter" idx="12"/>
+          </p:nvPr>
+        </p:nvSpPr>
+        <p:spPr/>
+        <p:txBody>
+          <a:bodyPr/>
+          <a:lstStyle/>
+          <a:p>
+            <a:pPr marL="342900" indent="-342900">
+              <a:buFont typeface="Arial" charset="0"/>
+              <a:buChar char="•"/>
+            </a:pPr>
+            <a:r>
+              <a:rPr lang="en-US" dirty="0" smtClean="0">
+                <a:solidFill>
+                  <a:srgbClr val="FF0000"/>
+                </a:solidFill>
+              </a:rPr>
+              <a:t>Redux</a:t>
+            </a:r>
+          </a:p>
+          <a:p>
+            <a:pPr marL="631825" lvl="1" indent="-342900">
+              <a:buFont typeface="Arial" charset="0"/>
+              <a:buChar char="•"/>
+            </a:pPr>
+            <a:r>
+              <a:rPr lang="en-US" dirty="0" smtClean="0"/>
+              <a:t>Allows shared </a:t>
+            </a:r>
+            <a:r>
+              <a:rPr lang="en-US" dirty="0" smtClean="0">
+                <a:solidFill>
+                  <a:srgbClr val="FF0000"/>
+                </a:solidFill>
+              </a:rPr>
+              <a:t>STATE</a:t>
+            </a:r>
+            <a:r>
+              <a:rPr lang="en-US" dirty="0" smtClean="0"/>
+              <a:t> between independent components</a:t>
+            </a:r>
+          </a:p>
+          <a:p>
+            <a:pPr marL="917575" lvl="2" indent="-342900">
+              <a:buFont typeface="Arial" charset="0"/>
+              <a:buChar char="•"/>
+            </a:pPr>
+            <a:r>
+              <a:rPr lang="en-US" dirty="0" smtClean="0"/>
+              <a:t>Alternative </a:t>
+            </a:r>
+            <a:r>
+              <a:rPr lang="mr-IN" dirty="0" smtClean="0"/>
+              <a:t>–</a:t>
+            </a:r>
+            <a:r>
+              <a:rPr lang="en-US" dirty="0" smtClean="0"/>
+              <a:t> pass parts of state down to unrelated components</a:t>
+            </a:r>
+          </a:p>
+          <a:p>
+            <a:pPr marL="631825" lvl="1" indent="-342900">
+              <a:buFont typeface="Arial" charset="0"/>
+              <a:buChar char="•"/>
+            </a:pPr>
+            <a:r>
+              <a:rPr lang="en-US" dirty="0" smtClean="0"/>
+              <a:t>Provides a </a:t>
+            </a:r>
+            <a:r>
+              <a:rPr lang="en-US" dirty="0" smtClean="0">
+                <a:solidFill>
+                  <a:srgbClr val="FF0000"/>
+                </a:solidFill>
+              </a:rPr>
+              <a:t>single</a:t>
+            </a:r>
+            <a:r>
+              <a:rPr lang="en-US" dirty="0" smtClean="0"/>
+              <a:t> </a:t>
+            </a:r>
+            <a:r>
+              <a:rPr lang="en-US" dirty="0" smtClean="0">
+                <a:solidFill>
+                  <a:srgbClr val="FF0000"/>
+                </a:solidFill>
+              </a:rPr>
+              <a:t>STATE</a:t>
+            </a:r>
+            <a:r>
+              <a:rPr lang="en-US" dirty="0" smtClean="0"/>
+              <a:t> for the entire app</a:t>
+            </a:r>
+          </a:p>
+          <a:p>
+            <a:pPr marL="631825" lvl="1" indent="-342900">
+              <a:buFont typeface="Arial" charset="0"/>
+              <a:buChar char="•"/>
+            </a:pPr>
+            <a:r>
+              <a:rPr lang="en-US" dirty="0" smtClean="0"/>
+              <a:t>Provides a Command Pattern interface (with </a:t>
+            </a:r>
+            <a:r>
+              <a:rPr lang="en-US" dirty="0" smtClean="0">
+                <a:solidFill>
+                  <a:srgbClr val="FF0000"/>
+                </a:solidFill>
+              </a:rPr>
+              <a:t>Actions</a:t>
+            </a:r>
+            <a:r>
+              <a:rPr lang="en-US" dirty="0" smtClean="0"/>
+              <a:t>)</a:t>
+            </a:r>
+          </a:p>
+          <a:p>
+            <a:pPr marL="917575" lvl="2" indent="-342900">
+              <a:buFont typeface="Arial" charset="0"/>
+              <a:buChar char="•"/>
+            </a:pPr>
+            <a:r>
+              <a:rPr lang="en-US" dirty="0" smtClean="0"/>
+              <a:t>Like Do / Undo / Redo implementations</a:t>
+            </a:r>
+          </a:p>
+          <a:p>
+            <a:pPr marL="631825" lvl="1" indent="-342900">
+              <a:buFont typeface="Arial" charset="0"/>
+              <a:buChar char="•"/>
+            </a:pPr>
+            <a:r>
+              <a:rPr lang="en-US" dirty="0" smtClean="0"/>
+              <a:t>Provides a standard way to modify the STATE</a:t>
+            </a:r>
+          </a:p>
+          <a:p>
+            <a:pPr marL="917575" lvl="2" indent="-342900">
+              <a:buFont typeface="Arial" charset="0"/>
+              <a:buChar char="•"/>
+            </a:pPr>
+            <a:r>
+              <a:rPr lang="en-US" dirty="0"/>
+              <a:t> </a:t>
+            </a:r>
+            <a:r>
+              <a:rPr lang="en-US" dirty="0" smtClean="0">
+                <a:solidFill>
+                  <a:srgbClr val="FF0000"/>
+                </a:solidFill>
+              </a:rPr>
+              <a:t>dispatch()</a:t>
+            </a:r>
+            <a:r>
+              <a:rPr lang="en-US" dirty="0" smtClean="0"/>
+              <a:t> method </a:t>
+            </a:r>
+            <a:r>
+              <a:rPr lang="en-US" dirty="0" smtClean="0">
+                <a:sym typeface="Wingdings"/>
+              </a:rPr>
+              <a:t> dispatches the commands (</a:t>
+            </a:r>
+            <a:r>
+              <a:rPr lang="en-US" dirty="0" smtClean="0">
+                <a:solidFill>
+                  <a:srgbClr val="FF0000"/>
+                </a:solidFill>
+                <a:sym typeface="Wingdings"/>
+              </a:rPr>
+              <a:t>Actions</a:t>
+            </a:r>
+            <a:r>
+              <a:rPr lang="en-US" dirty="0" smtClean="0">
+                <a:sym typeface="Wingdings"/>
+              </a:rPr>
+              <a:t>)</a:t>
+            </a:r>
+          </a:p>
+          <a:p>
+            <a:pPr marL="631825" lvl="1" indent="-342900">
+              <a:buFont typeface="Arial" charset="0"/>
+              <a:buChar char="•"/>
+            </a:pPr>
+            <a:r>
+              <a:rPr lang="en-US" dirty="0" smtClean="0">
+                <a:sym typeface="Wingdings"/>
+              </a:rPr>
+              <a:t>Provides a standard way to CREATE CONTAINERS</a:t>
+            </a:r>
+          </a:p>
+          <a:p>
+            <a:pPr marL="917575" lvl="2" indent="-342900">
+              <a:buFont typeface="Arial" charset="0"/>
+              <a:buChar char="•"/>
+            </a:pPr>
+            <a:r>
+              <a:rPr lang="en-US" dirty="0">
+                <a:sym typeface="Wingdings"/>
+              </a:rPr>
+              <a:t> </a:t>
+            </a:r>
+            <a:r>
+              <a:rPr lang="en-US" dirty="0" smtClean="0">
+                <a:solidFill>
+                  <a:srgbClr val="FF0000"/>
+                </a:solidFill>
+                <a:sym typeface="Wingdings"/>
+              </a:rPr>
+              <a:t>props</a:t>
+            </a:r>
+            <a:r>
+              <a:rPr lang="en-US" dirty="0" smtClean="0">
+                <a:sym typeface="Wingdings"/>
+              </a:rPr>
+              <a:t> are a subset of single STATE </a:t>
+            </a:r>
+          </a:p>
+          <a:p>
+            <a:pPr marL="917575" lvl="2" indent="-342900">
+              <a:buFont typeface="Arial" charset="0"/>
+              <a:buChar char="•"/>
+            </a:pPr>
+            <a:r>
+              <a:rPr lang="en-US" dirty="0" smtClean="0">
+                <a:sym typeface="Wingdings"/>
+              </a:rPr>
+              <a:t>Callbacks are wrappers around </a:t>
+            </a:r>
+            <a:r>
+              <a:rPr lang="en-US" dirty="0" smtClean="0">
+                <a:solidFill>
+                  <a:srgbClr val="FF0000"/>
+                </a:solidFill>
+                <a:sym typeface="Wingdings"/>
+              </a:rPr>
+              <a:t>dispatch()</a:t>
+            </a:r>
+            <a:r>
+              <a:rPr lang="en-US" dirty="0" smtClean="0">
+                <a:sym typeface="Wingdings"/>
+              </a:rPr>
+              <a:t> of Actions</a:t>
+            </a:r>
+            <a:endParaRPr lang="en-US" dirty="0" smtClean="0"/>
+          </a:p>
+          <a:p>
+            <a:pPr marL="631825" lvl="1" indent="-342900">
+              <a:buFont typeface="Arial" charset="0"/>
+              <a:buChar char="•"/>
+            </a:pPr>
+            <a:endParaRPr lang="en-US" dirty="0" smtClean="0"/>
+          </a:p>
+        </p:txBody>
+      </p:sp>
+      <p:sp>
+        <p:nvSpPr>
+          <p:cNvPr id="3" name="Title 2"/>
+          <p:cNvSpPr>
+            <a:spLocks noGrp="1"/>
+          </p:cNvSpPr>
+          <p:nvPr>
+            <p:ph type="title"/>
+          </p:nvPr>
+        </p:nvSpPr>
+        <p:spPr/>
+        <p:txBody>
+          <a:bodyPr/>
+          <a:lstStyle/>
+          <a:p>
+            <a:r>
+              <a:rPr lang="en-US" dirty="0" smtClean="0"/>
+              <a:t>Overview</a:t>
+            </a:r>
+            <a:endParaRPr lang="en-US" dirty="0"/>
+          </a:p>
+        </p:txBody>
+      </p:sp>
+    </p:spTree>
+    <p:extLst>
+      <p:ext uri="{BB962C8B-B14F-4D97-AF65-F5344CB8AC3E}">
+        <p14:creationId xmlns:p14="http://schemas.microsoft.com/office/powerpoint/2010/main" val="1263611602"/>
+      </p:ext>
+    </p:extLst>
+  </p:cSld>
+  <p:clrMapOvr>
+    <a:masterClrMapping/>
+  </p:clrMapOvr>
+  <mc:AlternateContent xmlns:mc="http://schemas.openxmlformats.org/markup-compatibility/2006" xmlns:p14="http://schemas.microsoft.com/office/powerpoint/2010/main">
+    <mc:Choice Requires="p14">
+      <p:transition p14:dur="0"/>
+    </mc:Choice>
+    <mc:Fallback xmlns="">
+      <p:transition/>
+    </mc:Fallback>
+  </mc:AlternateContent>
+  <p:timing>
+    <p:tnLst>
+      <p:par>
+        <p:cTn id="1" dur="indefinite" restart="never" nodeType="tmRoot"/>
+      </p:par>
+    </p:tnLst>
+  </p:timing>
+</p:sld>
+</file>
+
+<file path=ppt/slides/slide20.xml><?xml version="1.0" encoding="utf-8"?>
 <p:sld xmlns:a="http://schemas.openxmlformats.org/drawingml/2006/main" xmlns:r="http://schemas.openxmlformats.org/officeDocument/2006/relationships" xmlns:p="http://schemas.openxmlformats.org/presentationml/2006/main">
   <p:cSld>
     <p:spTree>
@@ -15752,7 +16459,11 @@
           <a:p>
             <a:r>
               <a:rPr lang="en-US" dirty="0" smtClean="0"/>
-              <a:t>Configure the Store </a:t>
+              <a:t>Configure </a:t>
+            </a:r>
+            <a:r>
+              <a:rPr lang="en-US" dirty="0" smtClean="0"/>
+              <a:t>Redux </a:t>
             </a:r>
             <a:r>
               <a:rPr lang="mr-IN" dirty="0" smtClean="0"/>
@@ -15760,7 +16471,11 @@
             </a:r>
             <a:r>
               <a:rPr lang="en-US" dirty="0" smtClean="0"/>
-              <a:t> Multiple Reducers</a:t>
+              <a:t> </a:t>
+            </a:r>
+            <a:r>
+              <a:rPr lang="en-US" dirty="0" smtClean="0"/>
+              <a:t>Multiple Reducers</a:t>
             </a:r>
             <a:endParaRPr lang="en-US" dirty="0"/>
           </a:p>
@@ -16049,538 +16764,6 @@
 </p:sld>
 </file>
 
-<file path=ppt/slides/slide2.xml><?xml version="1.0" encoding="utf-8"?>
-<p:sld xmlns:a="http://schemas.openxmlformats.org/drawingml/2006/main" xmlns:r="http://schemas.openxmlformats.org/officeDocument/2006/relationships" xmlns:p="http://schemas.openxmlformats.org/presentationml/2006/main">
-  <p:cSld>
-    <p:spTree>
-      <p:nvGrpSpPr>
-        <p:cNvPr id="1" name=""/>
-        <p:cNvGrpSpPr/>
-        <p:nvPr/>
-      </p:nvGrpSpPr>
-      <p:grpSpPr>
-        <a:xfrm>
-          <a:off x="0" y="0"/>
-          <a:ext cx="0" cy="0"/>
-          <a:chOff x="0" y="0"/>
-          <a:chExt cx="0" cy="0"/>
-        </a:xfrm>
-      </p:grpSpPr>
-      <p:sp>
-        <p:nvSpPr>
-          <p:cNvPr id="2" name="Text Placeholder 1"/>
-          <p:cNvSpPr>
-            <a:spLocks noGrp="1"/>
-          </p:cNvSpPr>
-          <p:nvPr>
-            <p:ph type="body" sz="quarter" idx="12"/>
-          </p:nvPr>
-        </p:nvSpPr>
-        <p:spPr/>
-        <p:txBody>
-          <a:bodyPr/>
-          <a:lstStyle/>
-          <a:p>
-            <a:pPr marL="342900" indent="-342900">
-              <a:buFont typeface="Arial" charset="0"/>
-              <a:buChar char="•"/>
-            </a:pPr>
-            <a:r>
-              <a:rPr lang="en-US" dirty="0" smtClean="0">
-                <a:solidFill>
-                  <a:srgbClr val="FF0000"/>
-                </a:solidFill>
-              </a:rPr>
-              <a:t>Redux</a:t>
-            </a:r>
-          </a:p>
-          <a:p>
-            <a:pPr marL="631825" lvl="1" indent="-342900">
-              <a:buFont typeface="Arial" charset="0"/>
-              <a:buChar char="•"/>
-            </a:pPr>
-            <a:r>
-              <a:rPr lang="en-US" dirty="0" smtClean="0"/>
-              <a:t>Allows shared </a:t>
-            </a:r>
-            <a:r>
-              <a:rPr lang="en-US" dirty="0" smtClean="0">
-                <a:solidFill>
-                  <a:srgbClr val="FF0000"/>
-                </a:solidFill>
-              </a:rPr>
-              <a:t>STATE</a:t>
-            </a:r>
-            <a:r>
-              <a:rPr lang="en-US" dirty="0" smtClean="0"/>
-              <a:t> between independent components</a:t>
-            </a:r>
-          </a:p>
-          <a:p>
-            <a:pPr marL="917575" lvl="2" indent="-342900">
-              <a:buFont typeface="Arial" charset="0"/>
-              <a:buChar char="•"/>
-            </a:pPr>
-            <a:r>
-              <a:rPr lang="en-US" dirty="0" smtClean="0"/>
-              <a:t>Alternative </a:t>
-            </a:r>
-            <a:r>
-              <a:rPr lang="mr-IN" dirty="0" smtClean="0"/>
-              <a:t>–</a:t>
-            </a:r>
-            <a:r>
-              <a:rPr lang="en-US" dirty="0" smtClean="0"/>
-              <a:t> pass parts of state down to unrelated components</a:t>
-            </a:r>
-          </a:p>
-          <a:p>
-            <a:pPr marL="631825" lvl="1" indent="-342900">
-              <a:buFont typeface="Arial" charset="0"/>
-              <a:buChar char="•"/>
-            </a:pPr>
-            <a:r>
-              <a:rPr lang="en-US" dirty="0" smtClean="0"/>
-              <a:t>Provides a </a:t>
-            </a:r>
-            <a:r>
-              <a:rPr lang="en-US" dirty="0" smtClean="0">
-                <a:solidFill>
-                  <a:srgbClr val="FF0000"/>
-                </a:solidFill>
-              </a:rPr>
-              <a:t>single</a:t>
-            </a:r>
-            <a:r>
-              <a:rPr lang="en-US" dirty="0" smtClean="0"/>
-              <a:t> </a:t>
-            </a:r>
-            <a:r>
-              <a:rPr lang="en-US" dirty="0" smtClean="0">
-                <a:solidFill>
-                  <a:srgbClr val="FF0000"/>
-                </a:solidFill>
-              </a:rPr>
-              <a:t>STATE</a:t>
-            </a:r>
-            <a:r>
-              <a:rPr lang="en-US" dirty="0" smtClean="0"/>
-              <a:t> for the entire app</a:t>
-            </a:r>
-          </a:p>
-          <a:p>
-            <a:pPr marL="631825" lvl="1" indent="-342900">
-              <a:buFont typeface="Arial" charset="0"/>
-              <a:buChar char="•"/>
-            </a:pPr>
-            <a:r>
-              <a:rPr lang="en-US" dirty="0" smtClean="0"/>
-              <a:t>Provides a Command Pattern interface (with </a:t>
-            </a:r>
-            <a:r>
-              <a:rPr lang="en-US" dirty="0" smtClean="0">
-                <a:solidFill>
-                  <a:srgbClr val="FF0000"/>
-                </a:solidFill>
-              </a:rPr>
-              <a:t>Actions</a:t>
-            </a:r>
-            <a:r>
-              <a:rPr lang="en-US" dirty="0" smtClean="0"/>
-              <a:t>)</a:t>
-            </a:r>
-          </a:p>
-          <a:p>
-            <a:pPr marL="917575" lvl="2" indent="-342900">
-              <a:buFont typeface="Arial" charset="0"/>
-              <a:buChar char="•"/>
-            </a:pPr>
-            <a:r>
-              <a:rPr lang="en-US" dirty="0" smtClean="0"/>
-              <a:t>Like Do / Undo / Redo implementations</a:t>
-            </a:r>
-          </a:p>
-          <a:p>
-            <a:pPr marL="631825" lvl="1" indent="-342900">
-              <a:buFont typeface="Arial" charset="0"/>
-              <a:buChar char="•"/>
-            </a:pPr>
-            <a:r>
-              <a:rPr lang="en-US" dirty="0" smtClean="0"/>
-              <a:t>Provides a standard way to modify the STATE</a:t>
-            </a:r>
-          </a:p>
-          <a:p>
-            <a:pPr marL="917575" lvl="2" indent="-342900">
-              <a:buFont typeface="Arial" charset="0"/>
-              <a:buChar char="•"/>
-            </a:pPr>
-            <a:r>
-              <a:rPr lang="en-US" dirty="0"/>
-              <a:t> </a:t>
-            </a:r>
-            <a:r>
-              <a:rPr lang="en-US" dirty="0" smtClean="0">
-                <a:solidFill>
-                  <a:srgbClr val="FF0000"/>
-                </a:solidFill>
-              </a:rPr>
-              <a:t>dispatch()</a:t>
-            </a:r>
-            <a:r>
-              <a:rPr lang="en-US" dirty="0" smtClean="0"/>
-              <a:t> method </a:t>
-            </a:r>
-            <a:r>
-              <a:rPr lang="en-US" dirty="0" smtClean="0">
-                <a:sym typeface="Wingdings"/>
-              </a:rPr>
-              <a:t> dispatches the commands (</a:t>
-            </a:r>
-            <a:r>
-              <a:rPr lang="en-US" dirty="0" smtClean="0">
-                <a:solidFill>
-                  <a:srgbClr val="FF0000"/>
-                </a:solidFill>
-                <a:sym typeface="Wingdings"/>
-              </a:rPr>
-              <a:t>Actions</a:t>
-            </a:r>
-            <a:r>
-              <a:rPr lang="en-US" dirty="0" smtClean="0">
-                <a:sym typeface="Wingdings"/>
-              </a:rPr>
-              <a:t>)</a:t>
-            </a:r>
-          </a:p>
-          <a:p>
-            <a:pPr marL="631825" lvl="1" indent="-342900">
-              <a:buFont typeface="Arial" charset="0"/>
-              <a:buChar char="•"/>
-            </a:pPr>
-            <a:r>
-              <a:rPr lang="en-US" dirty="0" smtClean="0">
-                <a:sym typeface="Wingdings"/>
-              </a:rPr>
-              <a:t>Provides a standard way to CREATE CONTAINERS</a:t>
-            </a:r>
-          </a:p>
-          <a:p>
-            <a:pPr marL="917575" lvl="2" indent="-342900">
-              <a:buFont typeface="Arial" charset="0"/>
-              <a:buChar char="•"/>
-            </a:pPr>
-            <a:r>
-              <a:rPr lang="en-US" dirty="0">
-                <a:sym typeface="Wingdings"/>
-              </a:rPr>
-              <a:t> </a:t>
-            </a:r>
-            <a:r>
-              <a:rPr lang="en-US" dirty="0" smtClean="0">
-                <a:solidFill>
-                  <a:srgbClr val="FF0000"/>
-                </a:solidFill>
-                <a:sym typeface="Wingdings"/>
-              </a:rPr>
-              <a:t>props</a:t>
-            </a:r>
-            <a:r>
-              <a:rPr lang="en-US" dirty="0" smtClean="0">
-                <a:sym typeface="Wingdings"/>
-              </a:rPr>
-              <a:t> are a subset of single STATE </a:t>
-            </a:r>
-          </a:p>
-          <a:p>
-            <a:pPr marL="917575" lvl="2" indent="-342900">
-              <a:buFont typeface="Arial" charset="0"/>
-              <a:buChar char="•"/>
-            </a:pPr>
-            <a:r>
-              <a:rPr lang="en-US" dirty="0" smtClean="0">
-                <a:sym typeface="Wingdings"/>
-              </a:rPr>
-              <a:t>Callbacks are wrappers around </a:t>
-            </a:r>
-            <a:r>
-              <a:rPr lang="en-US" dirty="0" smtClean="0">
-                <a:solidFill>
-                  <a:srgbClr val="FF0000"/>
-                </a:solidFill>
-                <a:sym typeface="Wingdings"/>
-              </a:rPr>
-              <a:t>dispatch()</a:t>
-            </a:r>
-            <a:r>
-              <a:rPr lang="en-US" dirty="0" smtClean="0">
-                <a:sym typeface="Wingdings"/>
-              </a:rPr>
-              <a:t> of Actions</a:t>
-            </a:r>
-            <a:endParaRPr lang="en-US" dirty="0" smtClean="0"/>
-          </a:p>
-          <a:p>
-            <a:pPr marL="631825" lvl="1" indent="-342900">
-              <a:buFont typeface="Arial" charset="0"/>
-              <a:buChar char="•"/>
-            </a:pPr>
-            <a:endParaRPr lang="en-US" dirty="0" smtClean="0"/>
-          </a:p>
-        </p:txBody>
-      </p:sp>
-      <p:sp>
-        <p:nvSpPr>
-          <p:cNvPr id="3" name="Title 2"/>
-          <p:cNvSpPr>
-            <a:spLocks noGrp="1"/>
-          </p:cNvSpPr>
-          <p:nvPr>
-            <p:ph type="title"/>
-          </p:nvPr>
-        </p:nvSpPr>
-        <p:spPr/>
-        <p:txBody>
-          <a:bodyPr/>
-          <a:lstStyle/>
-          <a:p>
-            <a:r>
-              <a:rPr lang="en-US" dirty="0" smtClean="0"/>
-              <a:t>Overview</a:t>
-            </a:r>
-            <a:endParaRPr lang="en-US" dirty="0"/>
-          </a:p>
-        </p:txBody>
-      </p:sp>
-    </p:spTree>
-    <p:extLst>
-      <p:ext uri="{BB962C8B-B14F-4D97-AF65-F5344CB8AC3E}">
-        <p14:creationId xmlns:p14="http://schemas.microsoft.com/office/powerpoint/2010/main" val="1263611602"/>
-      </p:ext>
-    </p:extLst>
-  </p:cSld>
-  <p:clrMapOvr>
-    <a:masterClrMapping/>
-  </p:clrMapOvr>
-  <mc:AlternateContent xmlns:mc="http://schemas.openxmlformats.org/markup-compatibility/2006" xmlns:p14="http://schemas.microsoft.com/office/powerpoint/2010/main">
-    <mc:Choice Requires="p14">
-      <p:transition p14:dur="0"/>
-    </mc:Choice>
-    <mc:Fallback xmlns="">
-      <p:transition/>
-    </mc:Fallback>
-  </mc:AlternateContent>
-  <p:timing>
-    <p:tnLst>
-      <p:par>
-        <p:cTn id="1" dur="indefinite" restart="never" nodeType="tmRoot"/>
-      </p:par>
-    </p:tnLst>
-  </p:timing>
-</p:sld>
-</file>
-
-<file path=ppt/slides/slide20.xml><?xml version="1.0" encoding="utf-8"?>
-<p:sld xmlns:a="http://schemas.openxmlformats.org/drawingml/2006/main" xmlns:r="http://schemas.openxmlformats.org/officeDocument/2006/relationships" xmlns:p="http://schemas.openxmlformats.org/presentationml/2006/main">
-  <p:cSld>
-    <p:spTree>
-      <p:nvGrpSpPr>
-        <p:cNvPr id="1" name=""/>
-        <p:cNvGrpSpPr/>
-        <p:nvPr/>
-      </p:nvGrpSpPr>
-      <p:grpSpPr>
-        <a:xfrm>
-          <a:off x="0" y="0"/>
-          <a:ext cx="0" cy="0"/>
-          <a:chOff x="0" y="0"/>
-          <a:chExt cx="0" cy="0"/>
-        </a:xfrm>
-      </p:grpSpPr>
-      <p:sp>
-        <p:nvSpPr>
-          <p:cNvPr id="2" name="Text Placeholder 1"/>
-          <p:cNvSpPr>
-            <a:spLocks noGrp="1"/>
-          </p:cNvSpPr>
-          <p:nvPr>
-            <p:ph type="body" sz="quarter" idx="12"/>
-          </p:nvPr>
-        </p:nvSpPr>
-        <p:spPr/>
-        <p:txBody>
-          <a:bodyPr/>
-          <a:lstStyle/>
-          <a:p>
-            <a:pPr marL="342900" indent="-342900">
-              <a:buFont typeface="Arial" charset="0"/>
-              <a:buChar char="•"/>
-            </a:pPr>
-            <a:r>
-              <a:rPr lang="en-US" dirty="0" smtClean="0"/>
-              <a:t>The store contains the state of the application</a:t>
-            </a:r>
-          </a:p>
-          <a:p>
-            <a:pPr marL="342900" indent="-342900">
-              <a:buFont typeface="Arial" charset="0"/>
-              <a:buChar char="•"/>
-            </a:pPr>
-            <a:r>
-              <a:rPr lang="en-US" dirty="0" smtClean="0"/>
-              <a:t>All it does is </a:t>
-            </a:r>
-            <a:r>
-              <a:rPr lang="en-US" dirty="0" smtClean="0">
-                <a:solidFill>
-                  <a:srgbClr val="FF0000"/>
-                </a:solidFill>
-              </a:rPr>
-              <a:t>CALL THE REDUCERS</a:t>
-            </a:r>
-          </a:p>
-          <a:p>
-            <a:pPr marL="631825" lvl="1" indent="-342900">
-              <a:buFont typeface="Arial" charset="0"/>
-              <a:buChar char="•"/>
-            </a:pPr>
-            <a:r>
-              <a:rPr lang="en-US" dirty="0" smtClean="0"/>
-              <a:t>Reducer changes the </a:t>
-            </a:r>
-            <a:r>
-              <a:rPr lang="en-US" dirty="0" smtClean="0">
-                <a:solidFill>
-                  <a:srgbClr val="FF0000"/>
-                </a:solidFill>
-              </a:rPr>
-              <a:t>STATE </a:t>
-            </a:r>
-          </a:p>
-          <a:p>
-            <a:pPr marL="342900" indent="-342900">
-              <a:buFont typeface="Arial" charset="0"/>
-              <a:buChar char="•"/>
-            </a:pPr>
-            <a:r>
-              <a:rPr lang="en-US" dirty="0" smtClean="0"/>
-              <a:t>Can register listeners </a:t>
-            </a:r>
-          </a:p>
-          <a:p>
-            <a:pPr marL="342900" indent="-342900">
-              <a:buFont typeface="Arial" charset="0"/>
-              <a:buChar char="•"/>
-            </a:pPr>
-            <a:r>
-              <a:rPr lang="en-US" dirty="0" smtClean="0"/>
-              <a:t>Only </a:t>
-            </a:r>
-            <a:r>
-              <a:rPr lang="en-US" dirty="0" smtClean="0">
-                <a:solidFill>
-                  <a:srgbClr val="FF0000"/>
-                </a:solidFill>
-              </a:rPr>
-              <a:t>ONE</a:t>
-            </a:r>
-            <a:r>
-              <a:rPr lang="en-US" dirty="0" smtClean="0"/>
-              <a:t> store in a Redux application</a:t>
-            </a:r>
-          </a:p>
-          <a:p>
-            <a:pPr marL="631825" lvl="1" indent="-342900">
-              <a:buFont typeface="Arial" charset="0"/>
-              <a:buChar char="•"/>
-            </a:pPr>
-            <a:r>
-              <a:rPr lang="en-US" dirty="0" smtClean="0"/>
-              <a:t>Contains the entire application state</a:t>
-            </a:r>
-          </a:p>
-          <a:p>
-            <a:pPr marL="631825" lvl="1" indent="-342900">
-              <a:buFont typeface="Arial" charset="0"/>
-              <a:buChar char="•"/>
-            </a:pPr>
-            <a:r>
-              <a:rPr lang="en-US" dirty="0" smtClean="0"/>
-              <a:t>Change the </a:t>
-            </a:r>
-            <a:r>
-              <a:rPr lang="en-US" dirty="0" smtClean="0">
-                <a:solidFill>
-                  <a:srgbClr val="FF0000"/>
-                </a:solidFill>
-              </a:rPr>
-              <a:t>STATE</a:t>
-            </a:r>
-            <a:r>
-              <a:rPr lang="en-US" dirty="0" smtClean="0"/>
-              <a:t> using the REDUCER pattern</a:t>
-            </a:r>
-          </a:p>
-          <a:p>
-            <a:pPr marL="631825" lvl="1" indent="-342900">
-              <a:buFont typeface="Arial" charset="0"/>
-              <a:buChar char="•"/>
-            </a:pPr>
-            <a:endParaRPr lang="en-US" dirty="0" smtClean="0"/>
-          </a:p>
-        </p:txBody>
-      </p:sp>
-      <p:sp>
-        <p:nvSpPr>
-          <p:cNvPr id="3" name="Title 2"/>
-          <p:cNvSpPr>
-            <a:spLocks noGrp="1"/>
-          </p:cNvSpPr>
-          <p:nvPr>
-            <p:ph type="title"/>
-          </p:nvPr>
-        </p:nvSpPr>
-        <p:spPr/>
-        <p:txBody>
-          <a:bodyPr/>
-          <a:lstStyle/>
-          <a:p>
-            <a:r>
-              <a:rPr lang="en-US" dirty="0" smtClean="0"/>
-              <a:t>Store</a:t>
-            </a:r>
-            <a:endParaRPr lang="en-US" dirty="0"/>
-          </a:p>
-        </p:txBody>
-      </p:sp>
-    </p:spTree>
-    <p:extLst>
-      <p:ext uri="{BB962C8B-B14F-4D97-AF65-F5344CB8AC3E}">
-        <p14:creationId xmlns:p14="http://schemas.microsoft.com/office/powerpoint/2010/main" val="1893326752"/>
-      </p:ext>
-    </p:extLst>
-  </p:cSld>
-  <p:clrMapOvr>
-    <a:masterClrMapping/>
-  </p:clrMapOvr>
-  <mc:AlternateContent xmlns:mc="http://schemas.openxmlformats.org/markup-compatibility/2006" xmlns:p14="http://schemas.microsoft.com/office/powerpoint/2010/main">
-    <mc:Choice Requires="p14">
-      <p:transition p14:dur="0"/>
-    </mc:Choice>
-    <mc:Fallback xmlns="">
-      <p:transition/>
-    </mc:Fallback>
-  </mc:AlternateContent>
-  <p:timing>
-    <p:tnLst>
-      <p:par>
-        <p:cTn id="1" dur="indefinite" restart="never" nodeType="tmRoot"/>
-      </p:par>
-    </p:tnLst>
-  </p:timing>
-</p:sld>
-</file>
-
 <file path=ppt/slides/slide21.xml><?xml version="1.0" encoding="utf-8"?>
 <p:sld xmlns:a="http://schemas.openxmlformats.org/drawingml/2006/main" xmlns:r="http://schemas.openxmlformats.org/officeDocument/2006/relationships" xmlns:p="http://schemas.openxmlformats.org/presentationml/2006/main">
   <p:cSld>
@@ -16619,7 +16802,25 @@
             </a:pPr>
             <a:r>
               <a:rPr lang="en-US" dirty="0" smtClean="0"/>
-              <a:t>Test Questions</a:t>
+              <a:t>The store contains the state of the application</a:t>
+            </a:r>
+          </a:p>
+          <a:p>
+            <a:pPr marL="342900" indent="-342900">
+              <a:buFont typeface="Arial" charset="0"/>
+              <a:buChar char="•"/>
+            </a:pPr>
+            <a:r>
+              <a:rPr lang="en-US" dirty="0" smtClean="0"/>
+              <a:t>All it does is </a:t>
+            </a:r>
+            <a:r>
+              <a:rPr lang="en-US" dirty="0" smtClean="0">
+                <a:solidFill>
+                  <a:srgbClr val="FF0000"/>
+                </a:solidFill>
+              </a:rPr>
+              <a:t>CALL THE REDUCERS</a:t>
             </a:r>
           </a:p>
           <a:p>
@@ -16628,14 +16829,49 @@
               <a:buChar char="•"/>
             </a:pPr>
             <a:r>
-              <a:rPr lang="en-US" dirty="0"/>
-              <a:t>How many copies of the STATE are there</a:t>
-            </a:r>
-            <a:r>
-              <a:rPr lang="en-US" dirty="0" smtClean="0"/>
-              <a:t>?</a:t>
-            </a:r>
-            <a:endParaRPr lang="en-US" dirty="0"/>
+              <a:rPr lang="en-US" dirty="0" smtClean="0"/>
+              <a:t>Reducer changes the </a:t>
+            </a:r>
+            <a:r>
+              <a:rPr lang="en-US" dirty="0" smtClean="0">
+                <a:solidFill>
+                  <a:srgbClr val="FF0000"/>
+                </a:solidFill>
+              </a:rPr>
+              <a:t>STATE </a:t>
+            </a:r>
+          </a:p>
+          <a:p>
+            <a:pPr marL="342900" indent="-342900">
+              <a:buFont typeface="Arial" charset="0"/>
+              <a:buChar char="•"/>
+            </a:pPr>
+            <a:r>
+              <a:rPr lang="en-US" dirty="0" smtClean="0"/>
+              <a:t>Can register listeners </a:t>
+            </a:r>
+          </a:p>
+          <a:p>
+            <a:pPr marL="342900" indent="-342900">
+              <a:buFont typeface="Arial" charset="0"/>
+              <a:buChar char="•"/>
+            </a:pPr>
+            <a:r>
+              <a:rPr lang="en-US" dirty="0" smtClean="0"/>
+              <a:t>Only </a:t>
+            </a:r>
+            <a:r>
+              <a:rPr lang="en-US" dirty="0" smtClean="0">
+                <a:solidFill>
+                  <a:srgbClr val="FF0000"/>
+                </a:solidFill>
+              </a:rPr>
+              <a:t>ONE</a:t>
+            </a:r>
+            <a:r>
+              <a:rPr lang="en-US" dirty="0" smtClean="0"/>
+              <a:t> store in a Redux application</a:t>
+            </a:r>
           </a:p>
           <a:p>
             <a:pPr marL="631825" lvl="1" indent="-342900">
@@ -16644,7 +16880,7 @@
             </a:pPr>
             <a:r>
               <a:rPr lang="en-US" dirty="0" smtClean="0"/>
-              <a:t>What does a reducer do?</a:t>
+              <a:t>Contains the entire application state</a:t>
             </a:r>
           </a:p>
           <a:p>
@@ -16654,55 +16890,20 @@
             </a:pPr>
             <a:r>
               <a:rPr lang="en-US" dirty="0" smtClean="0"/>
-              <a:t>What are the parameters to the reducer?</a:t>
-            </a:r>
-          </a:p>
-          <a:p>
-            <a:pPr marL="631825" lvl="1" indent="-342900">
-              <a:buFont typeface="Arial" charset="0"/>
-              <a:buChar char="•"/>
-            </a:pPr>
-            <a:r>
-              <a:rPr lang="en-US" dirty="0" smtClean="0"/>
-              <a:t>What does the reducer return?</a:t>
-            </a:r>
-          </a:p>
-          <a:p>
-            <a:pPr marL="631825" lvl="1" indent="-342900">
-              <a:buFont typeface="Arial" charset="0"/>
-              <a:buChar char="•"/>
-            </a:pPr>
-            <a:r>
-              <a:rPr lang="en-US" dirty="0" smtClean="0"/>
-              <a:t>How do you call the Redux store?</a:t>
-            </a:r>
-          </a:p>
-          <a:p>
-            <a:pPr marL="631825" lvl="1" indent="-342900">
-              <a:buFont typeface="Arial" charset="0"/>
-              <a:buChar char="•"/>
-            </a:pPr>
-            <a:r>
-              <a:rPr lang="en-US" dirty="0" smtClean="0"/>
-              <a:t>What is the parameter to dispatch()?</a:t>
-            </a:r>
-          </a:p>
-          <a:p>
-            <a:pPr marL="631825" lvl="1" indent="-342900">
-              <a:buFont typeface="Arial" charset="0"/>
-              <a:buChar char="•"/>
-            </a:pPr>
-            <a:r>
-              <a:rPr lang="en-US" dirty="0" smtClean="0"/>
-              <a:t>What object is the command?</a:t>
-            </a:r>
-          </a:p>
-          <a:p>
-            <a:pPr marL="631825" lvl="1" indent="-342900">
-              <a:buFont typeface="Arial" charset="0"/>
-              <a:buChar char="•"/>
-            </a:pPr>
-            <a:endParaRPr lang="en-US" dirty="0" smtClean="0"/>
+              <a:t>Change the </a:t>
+            </a:r>
+            <a:r>
+              <a:rPr lang="en-US" dirty="0" smtClean="0">
+                <a:solidFill>
+                  <a:srgbClr val="FF0000"/>
+                </a:solidFill>
+              </a:rPr>
+              <a:t>STATE</a:t>
+            </a:r>
+            <a:r>
+              <a:rPr lang="en-US" dirty="0" smtClean="0"/>
+              <a:t> using the REDUCER pattern</a:t>
+            </a:r>
           </a:p>
           <a:p>
             <a:pPr marL="631825" lvl="1" indent="-342900">
@@ -16730,7 +16931,7 @@
           <a:p>
             <a:r>
               <a:rPr lang="en-US" dirty="0" smtClean="0"/>
-              <a:t>In Summary</a:t>
+              <a:t>Store</a:t>
             </a:r>
             <a:endParaRPr lang="en-US" dirty="0"/>
           </a:p>
@@ -16739,7 +16940,7 @@
     </p:spTree>
     <p:extLst>
       <p:ext uri="{BB962C8B-B14F-4D97-AF65-F5344CB8AC3E}">
-        <p14:creationId xmlns:p14="http://schemas.microsoft.com/office/powerpoint/2010/main" val="427519743"/>
+        <p14:creationId xmlns:p14="http://schemas.microsoft.com/office/powerpoint/2010/main" val="1893326752"/>
       </p:ext>
     </p:extLst>
   </p:cSld>
@@ -16811,23 +17012,14 @@
               <a:buChar char="•"/>
             </a:pPr>
             <a:r>
-              <a:rPr lang="en-US" dirty="0" smtClean="0"/>
-              <a:t>How many copies of the STATE are there? </a:t>
-            </a:r>
-            <a:r>
-              <a:rPr lang="en-US" dirty="0" smtClean="0">
-                <a:solidFill>
-                  <a:srgbClr val="FF0000"/>
-                </a:solidFill>
-                <a:sym typeface="Wingdings"/>
-              </a:rPr>
-              <a:t> ONE</a:t>
-            </a:r>
-            <a:endParaRPr lang="en-US" dirty="0" smtClean="0">
-              <a:solidFill>
-                <a:srgbClr val="FF0000"/>
-              </a:solidFill>
-            </a:endParaRPr>
+              <a:rPr lang="en-US" dirty="0"/>
+              <a:t>How many copies of the STATE are there</a:t>
+            </a:r>
+            <a:r>
+              <a:rPr lang="en-US" dirty="0" smtClean="0"/>
+              <a:t>?</a:t>
+            </a:r>
+            <a:endParaRPr lang="en-US" dirty="0"/>
           </a:p>
           <a:p>
             <a:pPr marL="631825" lvl="1" indent="-342900">
@@ -16836,13 +17028,8 @@
             </a:pPr>
             <a:r>
               <a:rPr lang="en-US" dirty="0" smtClean="0"/>
-              <a:t>What does a reducer do? </a:t>
-            </a:r>
-            <a:endParaRPr lang="en-US" dirty="0" smtClean="0">
-              <a:solidFill>
-                <a:srgbClr val="FF0000"/>
-              </a:solidFill>
-            </a:endParaRPr>
+              <a:t>What does a reducer do?</a:t>
+            </a:r>
           </a:p>
           <a:p>
             <a:pPr marL="631825" lvl="1" indent="-342900">
@@ -16851,7 +17038,7 @@
             </a:pPr>
             <a:r>
               <a:rPr lang="en-US" dirty="0" smtClean="0"/>
-              <a:t>What are the parameters to the reducer? </a:t>
+              <a:t>What are the parameters to the reducer?</a:t>
             </a:r>
           </a:p>
           <a:p>
@@ -16860,7 +17047,7 @@
               <a:buChar char="•"/>
             </a:pPr>
             <a:r>
-              <a:rPr lang="en-US" dirty="0"/>
+              <a:rPr lang="en-US" dirty="0" smtClean="0"/>
               <a:t>What does the reducer return?</a:t>
             </a:r>
           </a:p>
@@ -16873,11 +17060,6 @@
               <a:rPr lang="en-US" dirty="0" smtClean="0"/>
               <a:t>How do you call the Redux store?</a:t>
             </a:r>
-            <a:endParaRPr lang="en-US" dirty="0" smtClean="0">
-              <a:solidFill>
-                <a:srgbClr val="FF0000"/>
-              </a:solidFill>
-            </a:endParaRPr>
           </a:p>
           <a:p>
             <a:pPr marL="631825" lvl="1" indent="-342900">
@@ -16886,13 +17068,8 @@
             </a:pPr>
             <a:r>
               <a:rPr lang="en-US" dirty="0" smtClean="0"/>
-              <a:t>What is the parameter to dispatch()? </a:t>
-            </a:r>
-            <a:endParaRPr lang="en-US" dirty="0" smtClean="0">
-              <a:solidFill>
-                <a:srgbClr val="FF0000"/>
-              </a:solidFill>
-            </a:endParaRPr>
+              <a:t>What is the parameter to dispatch()?</a:t>
+            </a:r>
           </a:p>
           <a:p>
             <a:pPr marL="631825" lvl="1" indent="-342900">
@@ -16901,13 +17078,8 @@
             </a:pPr>
             <a:r>
               <a:rPr lang="en-US" dirty="0" smtClean="0"/>
-              <a:t>What object is the command? </a:t>
-            </a:r>
-            <a:endParaRPr lang="en-US" dirty="0" smtClean="0">
-              <a:solidFill>
-                <a:srgbClr val="FF0000"/>
-              </a:solidFill>
-            </a:endParaRPr>
+              <a:t>What object is the command?</a:t>
+            </a:r>
           </a:p>
           <a:p>
             <a:pPr marL="631825" lvl="1" indent="-342900">
@@ -16951,7 +17123,7 @@
     </p:spTree>
     <p:extLst>
       <p:ext uri="{BB962C8B-B14F-4D97-AF65-F5344CB8AC3E}">
-        <p14:creationId xmlns:p14="http://schemas.microsoft.com/office/powerpoint/2010/main" val="1382046745"/>
+        <p14:creationId xmlns:p14="http://schemas.microsoft.com/office/powerpoint/2010/main" val="427519743"/>
       </p:ext>
     </p:extLst>
   </p:cSld>
@@ -17050,15 +17222,6 @@
               <a:rPr lang="en-US" dirty="0" smtClean="0"/>
               <a:t>What does a reducer do? </a:t>
             </a:r>
-            <a:r>
-              <a:rPr lang="en-US" dirty="0" smtClean="0">
-                <a:solidFill>
-                  <a:srgbClr val="FF0000"/>
-                </a:solidFill>
-                <a:sym typeface="Wingdings"/>
-              </a:rPr>
-              <a:t> changes the STATE</a:t>
-            </a:r>
             <a:endParaRPr lang="en-US" dirty="0" smtClean="0">
               <a:solidFill>
                 <a:srgbClr val="FF0000"/>
@@ -17072,7 +17235,27 @@
             </a:pPr>
             <a:r>
               <a:rPr lang="en-US" dirty="0" smtClean="0"/>
-              <a:t>What are the parameters to the reducer?</a:t>
+              <a:t>What are the parameters to the reducer? </a:t>
+            </a:r>
+          </a:p>
+          <a:p>
+            <a:pPr marL="631825" lvl="1" indent="-342900">
+              <a:buFont typeface="Arial" charset="0"/>
+              <a:buChar char="•"/>
+            </a:pPr>
+            <a:r>
+              <a:rPr lang="en-US" dirty="0"/>
+              <a:t>What does the reducer return?</a:t>
+            </a:r>
+          </a:p>
+          <a:p>
+            <a:pPr marL="631825" lvl="1" indent="-342900">
+              <a:buFont typeface="Arial" charset="0"/>
+              <a:buChar char="•"/>
+            </a:pPr>
+            <a:r>
+              <a:rPr lang="en-US" dirty="0" smtClean="0"/>
+              <a:t>How do you call the Redux store?</a:t>
             </a:r>
             <a:endParaRPr lang="en-US" dirty="0" smtClean="0">
               <a:solidFill>
@@ -17086,33 +17269,8 @@
               <a:buChar char="•"/>
             </a:pPr>
             <a:r>
-              <a:rPr lang="en-US" dirty="0"/>
-              <a:t>What does the reducer return?</a:t>
-            </a:r>
-          </a:p>
-          <a:p>
-            <a:pPr marL="631825" lvl="1" indent="-342900">
-              <a:buFont typeface="Arial" charset="0"/>
-              <a:buChar char="•"/>
-            </a:pPr>
-            <a:r>
-              <a:rPr lang="en-US" dirty="0" smtClean="0"/>
-              <a:t>How do you call the Redux store? </a:t>
-            </a:r>
-            <a:endParaRPr lang="en-US" dirty="0" smtClean="0">
-              <a:solidFill>
-                <a:srgbClr val="FF0000"/>
-              </a:solidFill>
-            </a:endParaRPr>
-          </a:p>
-          <a:p>
-            <a:pPr marL="631825" lvl="1" indent="-342900">
-              <a:buFont typeface="Arial" charset="0"/>
-              <a:buChar char="•"/>
-            </a:pPr>
-            <a:r>
-              <a:rPr lang="en-US" dirty="0" smtClean="0"/>
-              <a:t>What is the parameter to dispatch()?</a:t>
+              <a:rPr lang="en-US" dirty="0" smtClean="0"/>
+              <a:t>What is the parameter to dispatch()? </a:t>
             </a:r>
             <a:endParaRPr lang="en-US" dirty="0" smtClean="0">
               <a:solidFill>
@@ -17177,7 +17335,7 @@
     </p:spTree>
     <p:extLst>
       <p:ext uri="{BB962C8B-B14F-4D97-AF65-F5344CB8AC3E}">
-        <p14:creationId xmlns:p14="http://schemas.microsoft.com/office/powerpoint/2010/main" val="866996561"/>
+        <p14:creationId xmlns:p14="http://schemas.microsoft.com/office/powerpoint/2010/main" val="1382046745"/>
       </p:ext>
     </p:extLst>
   </p:cSld>
@@ -17298,16 +17456,7 @@
             </a:pPr>
             <a:r>
               <a:rPr lang="en-US" dirty="0" smtClean="0"/>
-              <a:t>What are the parameters to the reducer? </a:t>
-            </a:r>
-            <a:r>
-              <a:rPr lang="en-US" dirty="0" smtClean="0">
-                <a:solidFill>
-                  <a:srgbClr val="FF0000"/>
-                </a:solidFill>
-                <a:sym typeface="Wingdings"/>
-              </a:rPr>
-              <a:t> (state, action)</a:t>
+              <a:t>What are the parameters to the reducer?</a:t>
             </a:r>
             <a:endParaRPr lang="en-US" dirty="0" smtClean="0">
               <a:solidFill>
@@ -17332,7 +17481,7 @@
             </a:pPr>
             <a:r>
               <a:rPr lang="en-US" dirty="0" smtClean="0"/>
-              <a:t>How do you call the Redux store?</a:t>
+              <a:t>How do you call the Redux store? </a:t>
             </a:r>
             <a:endParaRPr lang="en-US" dirty="0" smtClean="0">
               <a:solidFill>
@@ -17412,7 +17561,7 @@
     </p:spTree>
     <p:extLst>
       <p:ext uri="{BB962C8B-B14F-4D97-AF65-F5344CB8AC3E}">
-        <p14:creationId xmlns:p14="http://schemas.microsoft.com/office/powerpoint/2010/main" val="934655832"/>
+        <p14:creationId xmlns:p14="http://schemas.microsoft.com/office/powerpoint/2010/main" val="866996561"/>
       </p:ext>
     </p:extLst>
   </p:cSld>
@@ -17557,26 +17706,8 @@
             </a:pPr>
             <a:r>
               <a:rPr lang="en-US" dirty="0"/>
-              <a:t>What does the reducer return</a:t>
-            </a:r>
-            <a:r>
-              <a:rPr lang="en-US" dirty="0" smtClean="0"/>
-              <a:t>? </a:t>
-            </a:r>
-            <a:r>
-              <a:rPr lang="en-US" dirty="0" smtClean="0">
-                <a:solidFill>
-                  <a:srgbClr val="FF0000"/>
-                </a:solidFill>
-                <a:sym typeface="Wingdings"/>
-              </a:rPr>
-              <a:t> the new state</a:t>
-            </a:r>
-            <a:endParaRPr lang="en-US" dirty="0">
-              <a:solidFill>
-                <a:srgbClr val="FF0000"/>
-              </a:solidFill>
-            </a:endParaRPr>
+              <a:t>What does the reducer return?</a:t>
+            </a:r>
           </a:p>
           <a:p>
             <a:pPr marL="631825" lvl="1" indent="-342900">
@@ -17665,7 +17796,7 @@
     </p:spTree>
     <p:extLst>
       <p:ext uri="{BB962C8B-B14F-4D97-AF65-F5344CB8AC3E}">
-        <p14:creationId xmlns:p14="http://schemas.microsoft.com/office/powerpoint/2010/main" val="117841500"/>
+        <p14:creationId xmlns:p14="http://schemas.microsoft.com/office/powerpoint/2010/main" val="934655832"/>
       </p:ext>
     </p:extLst>
   </p:cSld>
@@ -17810,10 +17941,14 @@
             </a:pPr>
             <a:r>
               <a:rPr lang="en-US" dirty="0"/>
-              <a:t>What does the reducer return? </a:t>
-            </a:r>
-            <a:r>
-              <a:rPr lang="en-US" dirty="0">
+              <a:t>What does the reducer return</a:t>
+            </a:r>
+            <a:r>
+              <a:rPr lang="en-US" dirty="0" smtClean="0"/>
+              <a:t>? </a:t>
+            </a:r>
+            <a:r>
+              <a:rPr lang="en-US" dirty="0" smtClean="0">
                 <a:solidFill>
                   <a:srgbClr val="FF0000"/>
                 </a:solidFill>
@@ -17834,16 +17969,7 @@
             </a:pPr>
             <a:r>
               <a:rPr lang="en-US" dirty="0" smtClean="0"/>
-              <a:t>How do you call the Redux store? </a:t>
-            </a:r>
-            <a:r>
-              <a:rPr lang="en-US" dirty="0" smtClean="0">
-                <a:solidFill>
-                  <a:srgbClr val="FF0000"/>
-                </a:solidFill>
-                <a:sym typeface="Wingdings"/>
-              </a:rPr>
-              <a:t> dispatch( action )</a:t>
+              <a:t>How do you call the Redux store?</a:t>
             </a:r>
             <a:endParaRPr lang="en-US" dirty="0" smtClean="0">
               <a:solidFill>
@@ -17858,8 +17984,13 @@
             </a:pPr>
             <a:r>
               <a:rPr lang="en-US" dirty="0" smtClean="0"/>
-              <a:t>What is the parameter to dispatch()? </a:t>
-            </a:r>
+              <a:t>What is the parameter to dispatch()?</a:t>
+            </a:r>
+            <a:endParaRPr lang="en-US" dirty="0" smtClean="0">
+              <a:solidFill>
+                <a:srgbClr val="FF0000"/>
+              </a:solidFill>
+            </a:endParaRPr>
           </a:p>
           <a:p>
             <a:pPr marL="631825" lvl="1" indent="-342900">
@@ -17870,6 +18001,18 @@
               <a:rPr lang="en-US" dirty="0" smtClean="0"/>
               <a:t>What object is the command? </a:t>
             </a:r>
+            <a:endParaRPr lang="en-US" dirty="0" smtClean="0">
+              <a:solidFill>
+                <a:srgbClr val="FF0000"/>
+              </a:solidFill>
+            </a:endParaRPr>
+          </a:p>
+          <a:p>
+            <a:pPr marL="631825" lvl="1" indent="-342900">
+              <a:buFont typeface="Arial" charset="0"/>
+              <a:buChar char="•"/>
+            </a:pPr>
+            <a:endParaRPr lang="en-US" dirty="0" smtClean="0"/>
           </a:p>
           <a:p>
             <a:pPr marL="631825" lvl="1" indent="-342900">
@@ -17906,7 +18049,7 @@
     </p:spTree>
     <p:extLst>
       <p:ext uri="{BB962C8B-B14F-4D97-AF65-F5344CB8AC3E}">
-        <p14:creationId xmlns:p14="http://schemas.microsoft.com/office/powerpoint/2010/main" val="2065174266"/>
+        <p14:creationId xmlns:p14="http://schemas.microsoft.com/office/powerpoint/2010/main" val="117841500"/>
       </p:ext>
     </p:extLst>
   </p:cSld>
@@ -18101,20 +18244,6 @@
               <a:rPr lang="en-US" dirty="0" smtClean="0"/>
               <a:t>What is the parameter to dispatch()? </a:t>
             </a:r>
-            <a:r>
-              <a:rPr lang="en-US" dirty="0" smtClean="0">
-                <a:solidFill>
-                  <a:srgbClr val="FF0000"/>
-                </a:solidFill>
-                <a:sym typeface="Wingdings"/>
-              </a:rPr>
-              <a:t> an ACTION</a:t>
-            </a:r>
-            <a:endParaRPr lang="en-US" dirty="0" smtClean="0">
-              <a:solidFill>
-                <a:srgbClr val="FF0000"/>
-              </a:solidFill>
-            </a:endParaRPr>
           </a:p>
           <a:p>
             <a:pPr marL="631825" lvl="1" indent="-342900">
@@ -18161,7 +18290,7 @@
     </p:spTree>
     <p:extLst>
       <p:ext uri="{BB962C8B-B14F-4D97-AF65-F5344CB8AC3E}">
-        <p14:creationId xmlns:p14="http://schemas.microsoft.com/office/powerpoint/2010/main" val="1753185848"/>
+        <p14:creationId xmlns:p14="http://schemas.microsoft.com/office/powerpoint/2010/main" val="2065174266"/>
       </p:ext>
     </p:extLst>
   </p:cSld>
@@ -18380,27 +18509,6 @@
               <a:rPr lang="en-US" dirty="0" smtClean="0"/>
               <a:t>What object is the command? </a:t>
             </a:r>
-            <a:r>
-              <a:rPr lang="en-US" dirty="0" smtClean="0">
-                <a:solidFill>
-                  <a:srgbClr val="FF0000"/>
-                </a:solidFill>
-                <a:sym typeface="Wingdings"/>
-              </a:rPr>
-              <a:t> the Action</a:t>
-            </a:r>
-            <a:endParaRPr lang="en-US" dirty="0" smtClean="0">
-              <a:solidFill>
-                <a:srgbClr val="FF0000"/>
-              </a:solidFill>
-            </a:endParaRPr>
-          </a:p>
-          <a:p>
-            <a:pPr marL="631825" lvl="1" indent="-342900">
-              <a:buFont typeface="Arial" charset="0"/>
-              <a:buChar char="•"/>
-            </a:pPr>
-            <a:endParaRPr lang="en-US" dirty="0" smtClean="0"/>
           </a:p>
           <a:p>
             <a:pPr marL="631825" lvl="1" indent="-342900">
@@ -18437,7 +18545,7 @@
     </p:spTree>
     <p:extLst>
       <p:ext uri="{BB962C8B-B14F-4D97-AF65-F5344CB8AC3E}">
-        <p14:creationId xmlns:p14="http://schemas.microsoft.com/office/powerpoint/2010/main" val="171426849"/>
+        <p14:creationId xmlns:p14="http://schemas.microsoft.com/office/powerpoint/2010/main" val="1753185848"/>
       </p:ext>
     </p:extLst>
   </p:cSld>
@@ -18500,78 +18608,190 @@
             </a:pPr>
             <a:r>
               <a:rPr lang="en-US" dirty="0" smtClean="0"/>
-              <a:t>But what about </a:t>
-            </a:r>
-            <a:r>
-              <a:rPr lang="en-US" dirty="0" err="1" smtClean="0"/>
-              <a:t>Async</a:t>
-            </a:r>
-            <a:r>
-              <a:rPr lang="en-US" dirty="0" smtClean="0"/>
-              <a:t> calls? </a:t>
-            </a:r>
-            <a:r>
-              <a:rPr lang="mr-IN" dirty="0" smtClean="0"/>
-              <a:t>–</a:t>
-            </a:r>
-            <a:r>
-              <a:rPr lang="en-US" dirty="0" smtClean="0"/>
-              <a:t> like to a RESTful service</a:t>
-            </a:r>
-          </a:p>
-          <a:p>
-            <a:pPr marL="342900" indent="-342900">
-              <a:buFont typeface="Arial" charset="0"/>
-              <a:buChar char="•"/>
-            </a:pPr>
-            <a:r>
-              <a:rPr lang="en-US" dirty="0" smtClean="0"/>
-              <a:t>The reducer handles state change based on the action</a:t>
-            </a:r>
-          </a:p>
-          <a:p>
-            <a:pPr marL="342900" indent="-342900">
-              <a:buFont typeface="Arial" charset="0"/>
-              <a:buChar char="•"/>
-            </a:pPr>
-            <a:r>
-              <a:rPr lang="en-US" dirty="0" smtClean="0"/>
-              <a:t>We get the </a:t>
-            </a:r>
-            <a:r>
-              <a:rPr lang="en-US" dirty="0" err="1" smtClean="0"/>
-              <a:t>Async</a:t>
-            </a:r>
-            <a:r>
-              <a:rPr lang="en-US" dirty="0" smtClean="0"/>
-              <a:t> data and dispatch the reducer </a:t>
+              <a:t>Test Questions</a:t>
+            </a:r>
+          </a:p>
+          <a:p>
+            <a:pPr marL="631825" lvl="1" indent="-342900">
+              <a:buFont typeface="Arial" charset="0"/>
+              <a:buChar char="•"/>
+            </a:pPr>
+            <a:r>
+              <a:rPr lang="en-US" dirty="0" smtClean="0"/>
+              <a:t>How many copies of the STATE are there? </a:t>
             </a:r>
             <a:r>
               <a:rPr lang="en-US" dirty="0" smtClean="0">
                 <a:solidFill>
                   <a:srgbClr val="FF0000"/>
                 </a:solidFill>
-              </a:rPr>
-              <a:t>ourselves</a:t>
-            </a:r>
-          </a:p>
-          <a:p>
-            <a:pPr marL="342900" indent="-342900">
-              <a:buFont typeface="Arial" charset="0"/>
-              <a:buChar char="•"/>
-            </a:pPr>
-            <a:r>
-              <a:rPr lang="en-US" dirty="0" smtClean="0"/>
-              <a:t>The next section discusses </a:t>
-            </a:r>
-            <a:r>
-              <a:rPr lang="en-US" dirty="0" err="1" smtClean="0"/>
-              <a:t>Async</a:t>
-            </a:r>
-            <a:r>
-              <a:rPr lang="en-US" dirty="0" smtClean="0"/>
-              <a:t> Actions</a:t>
-            </a:r>
+                <a:sym typeface="Wingdings"/>
+              </a:rPr>
+              <a:t> ONE</a:t>
+            </a:r>
+            <a:endParaRPr lang="en-US" dirty="0" smtClean="0">
+              <a:solidFill>
+                <a:srgbClr val="FF0000"/>
+              </a:solidFill>
+            </a:endParaRPr>
+          </a:p>
+          <a:p>
+            <a:pPr marL="631825" lvl="1" indent="-342900">
+              <a:buFont typeface="Arial" charset="0"/>
+              <a:buChar char="•"/>
+            </a:pPr>
+            <a:r>
+              <a:rPr lang="en-US" dirty="0" smtClean="0"/>
+              <a:t>What does a reducer do? </a:t>
+            </a:r>
+            <a:r>
+              <a:rPr lang="en-US" dirty="0" smtClean="0">
+                <a:solidFill>
+                  <a:srgbClr val="FF0000"/>
+                </a:solidFill>
+                <a:sym typeface="Wingdings"/>
+              </a:rPr>
+              <a:t> changes the STATE</a:t>
+            </a:r>
+            <a:endParaRPr lang="en-US" dirty="0" smtClean="0">
+              <a:solidFill>
+                <a:srgbClr val="FF0000"/>
+              </a:solidFill>
+            </a:endParaRPr>
+          </a:p>
+          <a:p>
+            <a:pPr marL="631825" lvl="1" indent="-342900">
+              <a:buFont typeface="Arial" charset="0"/>
+              <a:buChar char="•"/>
+            </a:pPr>
+            <a:r>
+              <a:rPr lang="en-US" dirty="0" smtClean="0"/>
+              <a:t>What are the parameters to the reducer? </a:t>
+            </a:r>
+            <a:r>
+              <a:rPr lang="en-US" dirty="0" smtClean="0">
+                <a:solidFill>
+                  <a:srgbClr val="FF0000"/>
+                </a:solidFill>
+                <a:sym typeface="Wingdings"/>
+              </a:rPr>
+              <a:t> (state, action)</a:t>
+            </a:r>
+            <a:endParaRPr lang="en-US" dirty="0" smtClean="0">
+              <a:solidFill>
+                <a:srgbClr val="FF0000"/>
+              </a:solidFill>
+            </a:endParaRPr>
+          </a:p>
+          <a:p>
+            <a:pPr marL="631825" lvl="1" indent="-342900">
+              <a:buFont typeface="Arial" charset="0"/>
+              <a:buChar char="•"/>
+            </a:pPr>
+            <a:r>
+              <a:rPr lang="en-US" dirty="0"/>
+              <a:t>What does the reducer return? </a:t>
+            </a:r>
+            <a:r>
+              <a:rPr lang="en-US" dirty="0">
+                <a:solidFill>
+                  <a:srgbClr val="FF0000"/>
+                </a:solidFill>
+                <a:sym typeface="Wingdings"/>
+              </a:rPr>
+              <a:t> the new state</a:t>
+            </a:r>
+            <a:endParaRPr lang="en-US" dirty="0">
+              <a:solidFill>
+                <a:srgbClr val="FF0000"/>
+              </a:solidFill>
+            </a:endParaRPr>
+          </a:p>
+          <a:p>
+            <a:pPr marL="631825" lvl="1" indent="-342900">
+              <a:buFont typeface="Arial" charset="0"/>
+              <a:buChar char="•"/>
+            </a:pPr>
+            <a:r>
+              <a:rPr lang="en-US" dirty="0" smtClean="0"/>
+              <a:t>How do you call the Redux store? </a:t>
+            </a:r>
+            <a:r>
+              <a:rPr lang="en-US" dirty="0" smtClean="0">
+                <a:solidFill>
+                  <a:srgbClr val="FF0000"/>
+                </a:solidFill>
+                <a:sym typeface="Wingdings"/>
+              </a:rPr>
+              <a:t> dispatch( action )</a:t>
+            </a:r>
+            <a:endParaRPr lang="en-US" dirty="0" smtClean="0">
+              <a:solidFill>
+                <a:srgbClr val="FF0000"/>
+              </a:solidFill>
+            </a:endParaRPr>
+          </a:p>
+          <a:p>
+            <a:pPr marL="631825" lvl="1" indent="-342900">
+              <a:buFont typeface="Arial" charset="0"/>
+              <a:buChar char="•"/>
+            </a:pPr>
+            <a:r>
+              <a:rPr lang="en-US" dirty="0" smtClean="0"/>
+              <a:t>What is the parameter to dispatch()? </a:t>
+            </a:r>
+            <a:r>
+              <a:rPr lang="en-US" dirty="0" smtClean="0">
+                <a:solidFill>
+                  <a:srgbClr val="FF0000"/>
+                </a:solidFill>
+                <a:sym typeface="Wingdings"/>
+              </a:rPr>
+              <a:t> an ACTION</a:t>
+            </a:r>
+            <a:endParaRPr lang="en-US" dirty="0" smtClean="0">
+              <a:solidFill>
+                <a:srgbClr val="FF0000"/>
+              </a:solidFill>
+            </a:endParaRPr>
+          </a:p>
+          <a:p>
+            <a:pPr marL="631825" lvl="1" indent="-342900">
+              <a:buFont typeface="Arial" charset="0"/>
+              <a:buChar char="•"/>
+            </a:pPr>
+            <a:r>
+              <a:rPr lang="en-US" dirty="0" smtClean="0"/>
+              <a:t>What object is the command? </a:t>
+            </a:r>
+            <a:r>
+              <a:rPr lang="en-US" dirty="0" smtClean="0">
+                <a:solidFill>
+                  <a:srgbClr val="FF0000"/>
+                </a:solidFill>
+                <a:sym typeface="Wingdings"/>
+              </a:rPr>
+              <a:t> the Action</a:t>
+            </a:r>
+            <a:endParaRPr lang="en-US" dirty="0" smtClean="0">
+              <a:solidFill>
+                <a:srgbClr val="FF0000"/>
+              </a:solidFill>
+            </a:endParaRPr>
+          </a:p>
+          <a:p>
+            <a:pPr marL="631825" lvl="1" indent="-342900">
+              <a:buFont typeface="Arial" charset="0"/>
+              <a:buChar char="•"/>
+            </a:pPr>
+            <a:endParaRPr lang="en-US" dirty="0" smtClean="0"/>
+          </a:p>
+          <a:p>
+            <a:pPr marL="631825" lvl="1" indent="-342900">
+              <a:buFont typeface="Arial" charset="0"/>
+              <a:buChar char="•"/>
+            </a:pPr>
+            <a:endParaRPr lang="en-US" dirty="0" smtClean="0"/>
           </a:p>
         </p:txBody>
       </p:sp>
@@ -18591,12 +18811,8 @@
           <a:lstStyle/>
           <a:p>
             <a:r>
-              <a:rPr lang="en-US" dirty="0" err="1" smtClean="0"/>
-              <a:t>Async</a:t>
-            </a:r>
-            <a:r>
-              <a:rPr lang="en-US" dirty="0" smtClean="0"/>
-              <a:t> Actions</a:t>
+              <a:rPr lang="en-US" dirty="0" smtClean="0"/>
+              <a:t>In Summary</a:t>
             </a:r>
             <a:endParaRPr lang="en-US" dirty="0"/>
           </a:p>
@@ -18605,7 +18821,7 @@
     </p:spTree>
     <p:extLst>
       <p:ext uri="{BB962C8B-B14F-4D97-AF65-F5344CB8AC3E}">
-        <p14:creationId xmlns:p14="http://schemas.microsoft.com/office/powerpoint/2010/main" val="272993305"/>
+        <p14:creationId xmlns:p14="http://schemas.microsoft.com/office/powerpoint/2010/main" val="171426849"/>
       </p:ext>
     </p:extLst>
   </p:cSld>
@@ -18954,6 +19170,174 @@
             </a:pPr>
             <a:r>
               <a:rPr lang="en-US" dirty="0" smtClean="0"/>
+              <a:t>But what about </a:t>
+            </a:r>
+            <a:r>
+              <a:rPr lang="en-US" dirty="0" err="1" smtClean="0"/>
+              <a:t>Async</a:t>
+            </a:r>
+            <a:r>
+              <a:rPr lang="en-US" dirty="0" smtClean="0"/>
+              <a:t> calls? </a:t>
+            </a:r>
+            <a:r>
+              <a:rPr lang="mr-IN" dirty="0" smtClean="0"/>
+              <a:t>–</a:t>
+            </a:r>
+            <a:r>
+              <a:rPr lang="en-US" dirty="0" smtClean="0"/>
+              <a:t> like to a RESTful service</a:t>
+            </a:r>
+          </a:p>
+          <a:p>
+            <a:pPr marL="342900" indent="-342900">
+              <a:buFont typeface="Arial" charset="0"/>
+              <a:buChar char="•"/>
+            </a:pPr>
+            <a:r>
+              <a:rPr lang="en-US" dirty="0" smtClean="0"/>
+              <a:t>The reducer handles state change based on the action</a:t>
+            </a:r>
+          </a:p>
+          <a:p>
+            <a:pPr marL="342900" indent="-342900">
+              <a:buFont typeface="Arial" charset="0"/>
+              <a:buChar char="•"/>
+            </a:pPr>
+            <a:r>
+              <a:rPr lang="en-US" dirty="0" smtClean="0"/>
+              <a:t>We get the </a:t>
+            </a:r>
+            <a:r>
+              <a:rPr lang="en-US" dirty="0" err="1" smtClean="0"/>
+              <a:t>Async</a:t>
+            </a:r>
+            <a:r>
+              <a:rPr lang="en-US" dirty="0" smtClean="0"/>
+              <a:t> data and dispatch the reducer </a:t>
+            </a:r>
+            <a:r>
+              <a:rPr lang="en-US" dirty="0" smtClean="0">
+                <a:solidFill>
+                  <a:srgbClr val="FF0000"/>
+                </a:solidFill>
+              </a:rPr>
+              <a:t>ourselves</a:t>
+            </a:r>
+          </a:p>
+          <a:p>
+            <a:pPr marL="342900" indent="-342900">
+              <a:buFont typeface="Arial" charset="0"/>
+              <a:buChar char="•"/>
+            </a:pPr>
+            <a:r>
+              <a:rPr lang="en-US" dirty="0" smtClean="0"/>
+              <a:t>The next section discusses </a:t>
+            </a:r>
+            <a:r>
+              <a:rPr lang="en-US" dirty="0" err="1" smtClean="0"/>
+              <a:t>Async</a:t>
+            </a:r>
+            <a:r>
+              <a:rPr lang="en-US" dirty="0" smtClean="0"/>
+              <a:t> Actions</a:t>
+            </a:r>
+          </a:p>
+        </p:txBody>
+      </p:sp>
+      <p:sp>
+        <p:nvSpPr>
+          <p:cNvPr id="3" name="Title 2"/>
+          <p:cNvSpPr>
+            <a:spLocks noGrp="1"/>
+          </p:cNvSpPr>
+          <p:nvPr>
+            <p:ph type="title"/>
+          </p:nvPr>
+        </p:nvSpPr>
+        <p:spPr/>
+        <p:txBody>
+          <a:bodyPr/>
+          <a:lstStyle/>
+          <a:p>
+            <a:r>
+              <a:rPr lang="en-US" dirty="0" err="1" smtClean="0"/>
+              <a:t>Async</a:t>
+            </a:r>
+            <a:r>
+              <a:rPr lang="en-US" dirty="0" smtClean="0"/>
+              <a:t> Actions</a:t>
+            </a:r>
+            <a:endParaRPr lang="en-US" dirty="0"/>
+          </a:p>
+        </p:txBody>
+      </p:sp>
+    </p:spTree>
+    <p:extLst>
+      <p:ext uri="{BB962C8B-B14F-4D97-AF65-F5344CB8AC3E}">
+        <p14:creationId xmlns:p14="http://schemas.microsoft.com/office/powerpoint/2010/main" val="272993305"/>
+      </p:ext>
+    </p:extLst>
+  </p:cSld>
+  <p:clrMapOvr>
+    <a:masterClrMapping/>
+  </p:clrMapOvr>
+  <mc:AlternateContent xmlns:mc="http://schemas.openxmlformats.org/markup-compatibility/2006" xmlns:p14="http://schemas.microsoft.com/office/powerpoint/2010/main">
+    <mc:Choice Requires="p14">
+      <p:transition p14:dur="0"/>
+    </mc:Choice>
+    <mc:Fallback xmlns="">
+      <p:transition/>
+    </mc:Fallback>
+  </mc:AlternateContent>
+  <p:timing>
+    <p:tnLst>
+      <p:par>
+        <p:cTn id="1" dur="indefinite" restart="never" nodeType="tmRoot"/>
+      </p:par>
+    </p:tnLst>
+  </p:timing>
+</p:sld>
+</file>
+
+<file path=ppt/slides/slide31.xml><?xml version="1.0" encoding="utf-8"?>
+<p:sld xmlns:a="http://schemas.openxmlformats.org/drawingml/2006/main" xmlns:r="http://schemas.openxmlformats.org/officeDocument/2006/relationships" xmlns:p="http://schemas.openxmlformats.org/presentationml/2006/main">
+  <p:cSld>
+    <p:spTree>
+      <p:nvGrpSpPr>
+        <p:cNvPr id="1" name=""/>
+        <p:cNvGrpSpPr/>
+        <p:nvPr/>
+      </p:nvGrpSpPr>
+      <p:grpSpPr>
+        <a:xfrm>
+          <a:off x="0" y="0"/>
+          <a:ext cx="0" cy="0"/>
+          <a:chOff x="0" y="0"/>
+          <a:chExt cx="0" cy="0"/>
+        </a:xfrm>
+      </p:grpSpPr>
+      <p:sp>
+        <p:nvSpPr>
+          <p:cNvPr id="2" name="Text Placeholder 1"/>
+          <p:cNvSpPr>
+            <a:spLocks noGrp="1"/>
+          </p:cNvSpPr>
+          <p:nvPr>
+            <p:ph type="body" sz="quarter" idx="12"/>
+          </p:nvPr>
+        </p:nvSpPr>
+        <p:spPr/>
+        <p:txBody>
+          <a:bodyPr/>
+          <a:lstStyle/>
+          <a:p>
+            <a:pPr marL="342900" indent="-342900">
+              <a:buFont typeface="Arial" charset="0"/>
+              <a:buChar char="•"/>
+            </a:pPr>
+            <a:r>
+              <a:rPr lang="en-US" dirty="0" smtClean="0"/>
               <a:t>There are a lot of moving parts in Redux</a:t>
             </a:r>
           </a:p>
@@ -19248,7 +19632,7 @@
 </p:sld>
 </file>
 
-<file path=ppt/slides/slide31.xml><?xml version="1.0" encoding="utf-8"?>
+<file path=ppt/slides/slide32.xml><?xml version="1.0" encoding="utf-8"?>
 <p:sld xmlns:a="http://schemas.openxmlformats.org/drawingml/2006/main" xmlns:r="http://schemas.openxmlformats.org/officeDocument/2006/relationships" xmlns:p="http://schemas.openxmlformats.org/presentationml/2006/main">
   <p:cSld>
     <p:spTree>

</xml_diff>